<commit_message>
Change in folder structure
</commit_message>
<xml_diff>
--- a/images/ArrayIndex.pptx
+++ b/images/ArrayIndex.pptx
@@ -9,8 +9,12 @@
     <p:sldId id="257" r:id="rId3"/>
     <p:sldId id="258" r:id="rId4"/>
     <p:sldId id="259" r:id="rId5"/>
-    <p:sldId id="260" r:id="rId6"/>
-    <p:sldId id="261" r:id="rId7"/>
+    <p:sldId id="264" r:id="rId6"/>
+    <p:sldId id="265" r:id="rId7"/>
+    <p:sldId id="260" r:id="rId8"/>
+    <p:sldId id="261" r:id="rId9"/>
+    <p:sldId id="262" r:id="rId10"/>
+    <p:sldId id="263" r:id="rId11"/>
   </p:sldIdLst>
   <p:sldSz cx="12192000" cy="6858000"/>
   <p:notesSz cx="6858000" cy="9144000"/>
@@ -248,7 +252,7 @@
           <a:p>
             <a:fld id="{6E95F330-DC13-4D7E-9BB4-97CFBD9A349B}" type="datetimeFigureOut">
               <a:rPr lang="en-US" smtClean="0"/>
-              <a:t>12-Oct-14</a:t>
+              <a:t>13-Nov-14</a:t>
             </a:fld>
             <a:endParaRPr lang="en-US"/>
           </a:p>
@@ -418,7 +422,7 @@
           <a:p>
             <a:fld id="{6E95F330-DC13-4D7E-9BB4-97CFBD9A349B}" type="datetimeFigureOut">
               <a:rPr lang="en-US" smtClean="0"/>
-              <a:t>12-Oct-14</a:t>
+              <a:t>13-Nov-14</a:t>
             </a:fld>
             <a:endParaRPr lang="en-US"/>
           </a:p>
@@ -598,7 +602,7 @@
           <a:p>
             <a:fld id="{6E95F330-DC13-4D7E-9BB4-97CFBD9A349B}" type="datetimeFigureOut">
               <a:rPr lang="en-US" smtClean="0"/>
-              <a:t>12-Oct-14</a:t>
+              <a:t>13-Nov-14</a:t>
             </a:fld>
             <a:endParaRPr lang="en-US"/>
           </a:p>
@@ -768,7 +772,7 @@
           <a:p>
             <a:fld id="{6E95F330-DC13-4D7E-9BB4-97CFBD9A349B}" type="datetimeFigureOut">
               <a:rPr lang="en-US" smtClean="0"/>
-              <a:t>12-Oct-14</a:t>
+              <a:t>13-Nov-14</a:t>
             </a:fld>
             <a:endParaRPr lang="en-US"/>
           </a:p>
@@ -1014,7 +1018,7 @@
           <a:p>
             <a:fld id="{6E95F330-DC13-4D7E-9BB4-97CFBD9A349B}" type="datetimeFigureOut">
               <a:rPr lang="en-US" smtClean="0"/>
-              <a:t>12-Oct-14</a:t>
+              <a:t>13-Nov-14</a:t>
             </a:fld>
             <a:endParaRPr lang="en-US"/>
           </a:p>
@@ -1246,7 +1250,7 @@
           <a:p>
             <a:fld id="{6E95F330-DC13-4D7E-9BB4-97CFBD9A349B}" type="datetimeFigureOut">
               <a:rPr lang="en-US" smtClean="0"/>
-              <a:t>12-Oct-14</a:t>
+              <a:t>13-Nov-14</a:t>
             </a:fld>
             <a:endParaRPr lang="en-US"/>
           </a:p>
@@ -1613,7 +1617,7 @@
           <a:p>
             <a:fld id="{6E95F330-DC13-4D7E-9BB4-97CFBD9A349B}" type="datetimeFigureOut">
               <a:rPr lang="en-US" smtClean="0"/>
-              <a:t>12-Oct-14</a:t>
+              <a:t>13-Nov-14</a:t>
             </a:fld>
             <a:endParaRPr lang="en-US"/>
           </a:p>
@@ -1731,7 +1735,7 @@
           <a:p>
             <a:fld id="{6E95F330-DC13-4D7E-9BB4-97CFBD9A349B}" type="datetimeFigureOut">
               <a:rPr lang="en-US" smtClean="0"/>
-              <a:t>12-Oct-14</a:t>
+              <a:t>13-Nov-14</a:t>
             </a:fld>
             <a:endParaRPr lang="en-US"/>
           </a:p>
@@ -1826,7 +1830,7 @@
           <a:p>
             <a:fld id="{6E95F330-DC13-4D7E-9BB4-97CFBD9A349B}" type="datetimeFigureOut">
               <a:rPr lang="en-US" smtClean="0"/>
-              <a:t>12-Oct-14</a:t>
+              <a:t>13-Nov-14</a:t>
             </a:fld>
             <a:endParaRPr lang="en-US"/>
           </a:p>
@@ -2103,7 +2107,7 @@
           <a:p>
             <a:fld id="{6E95F330-DC13-4D7E-9BB4-97CFBD9A349B}" type="datetimeFigureOut">
               <a:rPr lang="en-US" smtClean="0"/>
-              <a:t>12-Oct-14</a:t>
+              <a:t>13-Nov-14</a:t>
             </a:fld>
             <a:endParaRPr lang="en-US"/>
           </a:p>
@@ -2356,7 +2360,7 @@
           <a:p>
             <a:fld id="{6E95F330-DC13-4D7E-9BB4-97CFBD9A349B}" type="datetimeFigureOut">
               <a:rPr lang="en-US" smtClean="0"/>
-              <a:t>12-Oct-14</a:t>
+              <a:t>13-Nov-14</a:t>
             </a:fld>
             <a:endParaRPr lang="en-US"/>
           </a:p>
@@ -2569,7 +2573,7 @@
           <a:p>
             <a:fld id="{6E95F330-DC13-4D7E-9BB4-97CFBD9A349B}" type="datetimeFigureOut">
               <a:rPr lang="en-US" smtClean="0"/>
-              <a:t>12-Oct-14</a:t>
+              <a:t>13-Nov-14</a:t>
             </a:fld>
             <a:endParaRPr lang="en-US"/>
           </a:p>
@@ -3812,6 +3816,1044 @@
 </p:sld>
 </file>
 
+<file path=ppt/slides/slide10.xml><?xml version="1.0" encoding="utf-8"?>
+<p:sld xmlns:a="http://schemas.openxmlformats.org/drawingml/2006/main" xmlns:r="http://schemas.openxmlformats.org/officeDocument/2006/relationships" xmlns:p="http://schemas.openxmlformats.org/presentationml/2006/main">
+  <p:cSld>
+    <p:spTree>
+      <p:nvGrpSpPr>
+        <p:cNvPr id="1" name=""/>
+        <p:cNvGrpSpPr/>
+        <p:nvPr/>
+      </p:nvGrpSpPr>
+      <p:grpSpPr>
+        <a:xfrm>
+          <a:off x="0" y="0"/>
+          <a:ext cx="0" cy="0"/>
+          <a:chOff x="0" y="0"/>
+          <a:chExt cx="0" cy="0"/>
+        </a:xfrm>
+      </p:grpSpPr>
+      <p:sp>
+        <p:nvSpPr>
+          <p:cNvPr id="5" name="Rectangle 4"/>
+          <p:cNvSpPr/>
+          <p:nvPr/>
+        </p:nvSpPr>
+        <p:spPr>
+          <a:xfrm>
+            <a:off x="3740490" y="1109175"/>
+            <a:ext cx="3441359" cy="373503"/>
+          </a:xfrm>
+          <a:prstGeom prst="rect">
+            <a:avLst/>
+          </a:prstGeom>
+        </p:spPr>
+        <p:style>
+          <a:lnRef idx="2">
+            <a:schemeClr val="dk1"/>
+          </a:lnRef>
+          <a:fillRef idx="1">
+            <a:schemeClr val="lt1"/>
+          </a:fillRef>
+          <a:effectRef idx="0">
+            <a:schemeClr val="dk1"/>
+          </a:effectRef>
+          <a:fontRef idx="minor">
+            <a:schemeClr val="dk1"/>
+          </a:fontRef>
+        </p:style>
+        <p:txBody>
+          <a:bodyPr rtlCol="0" anchor="ctr"/>
+          <a:lstStyle/>
+          <a:p>
+            <a:pPr algn="ctr"/>
+            <a:r>
+              <a:rPr lang="en-US" dirty="0" smtClean="0"/>
+              <a:t>Static Constraint analysis</a:t>
+            </a:r>
+            <a:endParaRPr lang="en-US" dirty="0"/>
+          </a:p>
+        </p:txBody>
+      </p:sp>
+      <p:sp>
+        <p:nvSpPr>
+          <p:cNvPr id="6" name="Rounded Rectangle 5"/>
+          <p:cNvSpPr/>
+          <p:nvPr/>
+        </p:nvSpPr>
+        <p:spPr>
+          <a:xfrm>
+            <a:off x="3740489" y="52873"/>
+            <a:ext cx="1256011" cy="573659"/>
+          </a:xfrm>
+          <a:prstGeom prst="roundRect">
+            <a:avLst/>
+          </a:prstGeom>
+        </p:spPr>
+        <p:style>
+          <a:lnRef idx="2">
+            <a:schemeClr val="dk1"/>
+          </a:lnRef>
+          <a:fillRef idx="1">
+            <a:schemeClr val="lt1"/>
+          </a:fillRef>
+          <a:effectRef idx="0">
+            <a:schemeClr val="dk1"/>
+          </a:effectRef>
+          <a:fontRef idx="minor">
+            <a:schemeClr val="dk1"/>
+          </a:fontRef>
+        </p:style>
+        <p:txBody>
+          <a:bodyPr rtlCol="0" anchor="ctr"/>
+          <a:lstStyle/>
+          <a:p>
+            <a:pPr algn="ctr"/>
+            <a:r>
+              <a:rPr lang="en-US" sz="1600" dirty="0" smtClean="0"/>
+              <a:t>Byte code</a:t>
+            </a:r>
+            <a:endParaRPr lang="en-US" sz="1600" dirty="0"/>
+          </a:p>
+        </p:txBody>
+      </p:sp>
+      <p:sp>
+        <p:nvSpPr>
+          <p:cNvPr id="7" name="Rounded Rectangle 6"/>
+          <p:cNvSpPr/>
+          <p:nvPr/>
+        </p:nvSpPr>
+        <p:spPr>
+          <a:xfrm>
+            <a:off x="5925834" y="52873"/>
+            <a:ext cx="1370316" cy="573660"/>
+          </a:xfrm>
+          <a:prstGeom prst="roundRect">
+            <a:avLst/>
+          </a:prstGeom>
+        </p:spPr>
+        <p:style>
+          <a:lnRef idx="2">
+            <a:schemeClr val="dk1"/>
+          </a:lnRef>
+          <a:fillRef idx="1">
+            <a:schemeClr val="lt1"/>
+          </a:fillRef>
+          <a:effectRef idx="0">
+            <a:schemeClr val="dk1"/>
+          </a:effectRef>
+          <a:fontRef idx="minor">
+            <a:schemeClr val="dk1"/>
+          </a:fontRef>
+        </p:style>
+        <p:txBody>
+          <a:bodyPr rtlCol="0" anchor="ctr"/>
+          <a:lstStyle/>
+          <a:p>
+            <a:pPr algn="ctr"/>
+            <a:r>
+              <a:rPr lang="en-US" sz="1600" dirty="0" smtClean="0"/>
+              <a:t>Output from taint analysis</a:t>
+            </a:r>
+            <a:endParaRPr lang="en-US" sz="1600" dirty="0"/>
+          </a:p>
+        </p:txBody>
+      </p:sp>
+      <p:cxnSp>
+        <p:nvCxnSpPr>
+          <p:cNvPr id="9" name="Straight Arrow Connector 8"/>
+          <p:cNvCxnSpPr>
+            <a:endCxn id="5" idx="0"/>
+          </p:cNvCxnSpPr>
+          <p:nvPr/>
+        </p:nvCxnSpPr>
+        <p:spPr>
+          <a:xfrm>
+            <a:off x="4368495" y="626532"/>
+            <a:ext cx="1092675" cy="482643"/>
+          </a:xfrm>
+          <a:prstGeom prst="straightConnector1">
+            <a:avLst/>
+          </a:prstGeom>
+          <a:ln w="19050">
+            <a:tailEnd type="triangle"/>
+          </a:ln>
+        </p:spPr>
+        <p:style>
+          <a:lnRef idx="1">
+            <a:schemeClr val="dk1"/>
+          </a:lnRef>
+          <a:fillRef idx="0">
+            <a:schemeClr val="dk1"/>
+          </a:fillRef>
+          <a:effectRef idx="0">
+            <a:schemeClr val="dk1"/>
+          </a:effectRef>
+          <a:fontRef idx="minor">
+            <a:schemeClr val="tx1"/>
+          </a:fontRef>
+        </p:style>
+      </p:cxnSp>
+      <p:cxnSp>
+        <p:nvCxnSpPr>
+          <p:cNvPr id="12" name="Straight Arrow Connector 11"/>
+          <p:cNvCxnSpPr>
+            <a:endCxn id="5" idx="0"/>
+          </p:cNvCxnSpPr>
+          <p:nvPr/>
+        </p:nvCxnSpPr>
+        <p:spPr>
+          <a:xfrm flipH="1">
+            <a:off x="5461170" y="626533"/>
+            <a:ext cx="1092671" cy="482642"/>
+          </a:xfrm>
+          <a:prstGeom prst="straightConnector1">
+            <a:avLst/>
+          </a:prstGeom>
+          <a:ln w="19050">
+            <a:tailEnd type="triangle"/>
+          </a:ln>
+        </p:spPr>
+        <p:style>
+          <a:lnRef idx="1">
+            <a:schemeClr val="dk1"/>
+          </a:lnRef>
+          <a:fillRef idx="0">
+            <a:schemeClr val="dk1"/>
+          </a:fillRef>
+          <a:effectRef idx="0">
+            <a:schemeClr val="dk1"/>
+          </a:effectRef>
+          <a:fontRef idx="minor">
+            <a:schemeClr val="tx1"/>
+          </a:fontRef>
+        </p:style>
+      </p:cxnSp>
+      <p:sp>
+        <p:nvSpPr>
+          <p:cNvPr id="61" name="Rectangle 60"/>
+          <p:cNvSpPr/>
+          <p:nvPr/>
+        </p:nvSpPr>
+        <p:spPr>
+          <a:xfrm>
+            <a:off x="3740489" y="1778568"/>
+            <a:ext cx="3441359" cy="373503"/>
+          </a:xfrm>
+          <a:prstGeom prst="rect">
+            <a:avLst/>
+          </a:prstGeom>
+        </p:spPr>
+        <p:style>
+          <a:lnRef idx="2">
+            <a:schemeClr val="dk1"/>
+          </a:lnRef>
+          <a:fillRef idx="1">
+            <a:schemeClr val="lt1"/>
+          </a:fillRef>
+          <a:effectRef idx="0">
+            <a:schemeClr val="dk1"/>
+          </a:effectRef>
+          <a:fontRef idx="minor">
+            <a:schemeClr val="dk1"/>
+          </a:fontRef>
+        </p:style>
+        <p:txBody>
+          <a:bodyPr rtlCol="0" anchor="ctr"/>
+          <a:lstStyle/>
+          <a:p>
+            <a:pPr algn="ctr"/>
+            <a:r>
+              <a:rPr lang="en-US" dirty="0" smtClean="0"/>
+              <a:t>Skip the Unit if tagged unsafe</a:t>
+            </a:r>
+            <a:endParaRPr lang="en-US" dirty="0"/>
+          </a:p>
+        </p:txBody>
+      </p:sp>
+      <p:sp>
+        <p:nvSpPr>
+          <p:cNvPr id="65" name="Rectangle 64"/>
+          <p:cNvSpPr/>
+          <p:nvPr/>
+        </p:nvSpPr>
+        <p:spPr>
+          <a:xfrm>
+            <a:off x="3740489" y="2447962"/>
+            <a:ext cx="3441359" cy="501566"/>
+          </a:xfrm>
+          <a:prstGeom prst="rect">
+            <a:avLst/>
+          </a:prstGeom>
+        </p:spPr>
+        <p:style>
+          <a:lnRef idx="2">
+            <a:schemeClr val="dk1"/>
+          </a:lnRef>
+          <a:fillRef idx="1">
+            <a:schemeClr val="lt1"/>
+          </a:fillRef>
+          <a:effectRef idx="0">
+            <a:schemeClr val="dk1"/>
+          </a:effectRef>
+          <a:fontRef idx="minor">
+            <a:schemeClr val="dk1"/>
+          </a:fontRef>
+        </p:style>
+        <p:txBody>
+          <a:bodyPr rtlCol="0" anchor="ctr"/>
+          <a:lstStyle/>
+          <a:p>
+            <a:pPr algn="ctr"/>
+            <a:r>
+              <a:rPr lang="en-US" dirty="0" smtClean="0"/>
+              <a:t>Determine if the Unit can throw runtime exception</a:t>
+            </a:r>
+            <a:endParaRPr lang="en-US" dirty="0"/>
+          </a:p>
+        </p:txBody>
+      </p:sp>
+      <p:sp>
+        <p:nvSpPr>
+          <p:cNvPr id="66" name="Rectangle 65"/>
+          <p:cNvSpPr/>
+          <p:nvPr/>
+        </p:nvSpPr>
+        <p:spPr>
+          <a:xfrm>
+            <a:off x="3740489" y="3304107"/>
+            <a:ext cx="3441359" cy="501566"/>
+          </a:xfrm>
+          <a:prstGeom prst="rect">
+            <a:avLst/>
+          </a:prstGeom>
+        </p:spPr>
+        <p:style>
+          <a:lnRef idx="2">
+            <a:schemeClr val="dk1"/>
+          </a:lnRef>
+          <a:fillRef idx="1">
+            <a:schemeClr val="lt1"/>
+          </a:fillRef>
+          <a:effectRef idx="0">
+            <a:schemeClr val="dk1"/>
+          </a:effectRef>
+          <a:fontRef idx="minor">
+            <a:schemeClr val="dk1"/>
+          </a:fontRef>
+        </p:style>
+        <p:txBody>
+          <a:bodyPr rtlCol="0" anchor="ctr"/>
+          <a:lstStyle/>
+          <a:p>
+            <a:pPr algn="ctr"/>
+            <a:r>
+              <a:rPr lang="en-US" dirty="0" smtClean="0"/>
+              <a:t>Instrument the object by solving the static constraints</a:t>
+            </a:r>
+            <a:endParaRPr lang="en-US" dirty="0"/>
+          </a:p>
+        </p:txBody>
+      </p:sp>
+      <p:cxnSp>
+        <p:nvCxnSpPr>
+          <p:cNvPr id="67" name="Straight Arrow Connector 66"/>
+          <p:cNvCxnSpPr>
+            <a:stCxn id="5" idx="2"/>
+            <a:endCxn id="61" idx="0"/>
+          </p:cNvCxnSpPr>
+          <p:nvPr/>
+        </p:nvCxnSpPr>
+        <p:spPr>
+          <a:xfrm flipH="1">
+            <a:off x="5461169" y="1482678"/>
+            <a:ext cx="1" cy="295890"/>
+          </a:xfrm>
+          <a:prstGeom prst="straightConnector1">
+            <a:avLst/>
+          </a:prstGeom>
+          <a:ln w="19050">
+            <a:tailEnd type="triangle"/>
+          </a:ln>
+        </p:spPr>
+        <p:style>
+          <a:lnRef idx="1">
+            <a:schemeClr val="dk1"/>
+          </a:lnRef>
+          <a:fillRef idx="0">
+            <a:schemeClr val="dk1"/>
+          </a:fillRef>
+          <a:effectRef idx="0">
+            <a:schemeClr val="dk1"/>
+          </a:effectRef>
+          <a:fontRef idx="minor">
+            <a:schemeClr val="tx1"/>
+          </a:fontRef>
+        </p:style>
+      </p:cxnSp>
+      <p:cxnSp>
+        <p:nvCxnSpPr>
+          <p:cNvPr id="70" name="Straight Arrow Connector 69"/>
+          <p:cNvCxnSpPr>
+            <a:stCxn id="61" idx="2"/>
+            <a:endCxn id="65" idx="0"/>
+          </p:cNvCxnSpPr>
+          <p:nvPr/>
+        </p:nvCxnSpPr>
+        <p:spPr>
+          <a:xfrm>
+            <a:off x="5461169" y="2152071"/>
+            <a:ext cx="0" cy="295891"/>
+          </a:xfrm>
+          <a:prstGeom prst="straightConnector1">
+            <a:avLst/>
+          </a:prstGeom>
+          <a:ln w="19050">
+            <a:tailEnd type="triangle"/>
+          </a:ln>
+        </p:spPr>
+        <p:style>
+          <a:lnRef idx="1">
+            <a:schemeClr val="dk1"/>
+          </a:lnRef>
+          <a:fillRef idx="0">
+            <a:schemeClr val="dk1"/>
+          </a:fillRef>
+          <a:effectRef idx="0">
+            <a:schemeClr val="dk1"/>
+          </a:effectRef>
+          <a:fontRef idx="minor">
+            <a:schemeClr val="tx1"/>
+          </a:fontRef>
+        </p:style>
+      </p:cxnSp>
+      <p:cxnSp>
+        <p:nvCxnSpPr>
+          <p:cNvPr id="73" name="Straight Arrow Connector 72"/>
+          <p:cNvCxnSpPr>
+            <a:stCxn id="65" idx="2"/>
+            <a:endCxn id="66" idx="0"/>
+          </p:cNvCxnSpPr>
+          <p:nvPr/>
+        </p:nvCxnSpPr>
+        <p:spPr>
+          <a:xfrm>
+            <a:off x="5461169" y="2949528"/>
+            <a:ext cx="0" cy="354579"/>
+          </a:xfrm>
+          <a:prstGeom prst="straightConnector1">
+            <a:avLst/>
+          </a:prstGeom>
+          <a:ln w="19050">
+            <a:tailEnd type="triangle"/>
+          </a:ln>
+        </p:spPr>
+        <p:style>
+          <a:lnRef idx="1">
+            <a:schemeClr val="dk1"/>
+          </a:lnRef>
+          <a:fillRef idx="0">
+            <a:schemeClr val="dk1"/>
+          </a:fillRef>
+          <a:effectRef idx="0">
+            <a:schemeClr val="dk1"/>
+          </a:effectRef>
+          <a:fontRef idx="minor">
+            <a:schemeClr val="tx1"/>
+          </a:fontRef>
+        </p:style>
+      </p:cxnSp>
+      <p:sp>
+        <p:nvSpPr>
+          <p:cNvPr id="76" name="TextBox 75"/>
+          <p:cNvSpPr txBox="1"/>
+          <p:nvPr/>
+        </p:nvSpPr>
+        <p:spPr>
+          <a:xfrm>
+            <a:off x="5461168" y="2949528"/>
+            <a:ext cx="457882" cy="338554"/>
+          </a:xfrm>
+          <a:prstGeom prst="rect">
+            <a:avLst/>
+          </a:prstGeom>
+          <a:noFill/>
+          <a:ln w="19050">
+            <a:noFill/>
+          </a:ln>
+        </p:spPr>
+        <p:txBody>
+          <a:bodyPr wrap="none" rtlCol="0">
+            <a:spAutoFit/>
+          </a:bodyPr>
+          <a:lstStyle/>
+          <a:p>
+            <a:r>
+              <a:rPr lang="en-US" sz="1600" dirty="0" smtClean="0"/>
+              <a:t>yes</a:t>
+            </a:r>
+            <a:endParaRPr lang="en-US" sz="1600" dirty="0"/>
+          </a:p>
+        </p:txBody>
+      </p:sp>
+      <p:cxnSp>
+        <p:nvCxnSpPr>
+          <p:cNvPr id="78" name="Elbow Connector 77"/>
+          <p:cNvCxnSpPr>
+            <a:stCxn id="5" idx="1"/>
+            <a:endCxn id="66" idx="1"/>
+          </p:cNvCxnSpPr>
+          <p:nvPr/>
+        </p:nvCxnSpPr>
+        <p:spPr>
+          <a:xfrm rot="10800000" flipV="1">
+            <a:off x="3740490" y="1295926"/>
+            <a:ext cx="1" cy="2258963"/>
+          </a:xfrm>
+          <a:prstGeom prst="bentConnector3">
+            <a:avLst>
+              <a:gd name="adj1" fmla="val 22860100000"/>
+            </a:avLst>
+          </a:prstGeom>
+          <a:ln w="19050">
+            <a:tailEnd type="triangle"/>
+          </a:ln>
+        </p:spPr>
+        <p:style>
+          <a:lnRef idx="1">
+            <a:schemeClr val="dk1"/>
+          </a:lnRef>
+          <a:fillRef idx="0">
+            <a:schemeClr val="dk1"/>
+          </a:fillRef>
+          <a:effectRef idx="0">
+            <a:schemeClr val="dk1"/>
+          </a:effectRef>
+          <a:fontRef idx="minor">
+            <a:schemeClr val="tx1"/>
+          </a:fontRef>
+        </p:style>
+      </p:cxnSp>
+      <p:sp>
+        <p:nvSpPr>
+          <p:cNvPr id="81" name="TextBox 80"/>
+          <p:cNvSpPr txBox="1"/>
+          <p:nvPr/>
+        </p:nvSpPr>
+        <p:spPr>
+          <a:xfrm rot="16200000">
+            <a:off x="2904353" y="1593237"/>
+            <a:ext cx="1147564" cy="584775"/>
+          </a:xfrm>
+          <a:prstGeom prst="rect">
+            <a:avLst/>
+          </a:prstGeom>
+          <a:noFill/>
+          <a:ln w="19050">
+            <a:noFill/>
+          </a:ln>
+        </p:spPr>
+        <p:txBody>
+          <a:bodyPr wrap="square" rtlCol="0">
+            <a:spAutoFit/>
+          </a:bodyPr>
+          <a:lstStyle/>
+          <a:p>
+            <a:r>
+              <a:rPr lang="en-US" sz="1600" dirty="0" smtClean="0"/>
+              <a:t>    Set of constraints</a:t>
+            </a:r>
+            <a:endParaRPr lang="en-US" sz="1600" dirty="0"/>
+          </a:p>
+        </p:txBody>
+      </p:sp>
+      <p:sp>
+        <p:nvSpPr>
+          <p:cNvPr id="86" name="Rectangle 85"/>
+          <p:cNvSpPr/>
+          <p:nvPr/>
+        </p:nvSpPr>
+        <p:spPr>
+          <a:xfrm>
+            <a:off x="3740489" y="4160252"/>
+            <a:ext cx="3441359" cy="501566"/>
+          </a:xfrm>
+          <a:prstGeom prst="rect">
+            <a:avLst/>
+          </a:prstGeom>
+        </p:spPr>
+        <p:style>
+          <a:lnRef idx="2">
+            <a:schemeClr val="dk1"/>
+          </a:lnRef>
+          <a:fillRef idx="1">
+            <a:schemeClr val="lt1"/>
+          </a:fillRef>
+          <a:effectRef idx="0">
+            <a:schemeClr val="dk1"/>
+          </a:effectRef>
+          <a:fontRef idx="minor">
+            <a:schemeClr val="dk1"/>
+          </a:fontRef>
+        </p:style>
+        <p:txBody>
+          <a:bodyPr rtlCol="0" anchor="ctr"/>
+          <a:lstStyle/>
+          <a:p>
+            <a:pPr algn="ctr"/>
+            <a:r>
+              <a:rPr lang="en-US" dirty="0" smtClean="0"/>
+              <a:t>Instrument the object by modifying its properties</a:t>
+            </a:r>
+            <a:endParaRPr lang="en-US" dirty="0"/>
+          </a:p>
+        </p:txBody>
+      </p:sp>
+      <p:cxnSp>
+        <p:nvCxnSpPr>
+          <p:cNvPr id="88" name="Elbow Connector 87"/>
+          <p:cNvCxnSpPr>
+            <a:stCxn id="65" idx="3"/>
+            <a:endCxn id="86" idx="3"/>
+          </p:cNvCxnSpPr>
+          <p:nvPr/>
+        </p:nvCxnSpPr>
+        <p:spPr>
+          <a:xfrm>
+            <a:off x="7181848" y="2698745"/>
+            <a:ext cx="12700" cy="1712290"/>
+          </a:xfrm>
+          <a:prstGeom prst="bentConnector3">
+            <a:avLst>
+              <a:gd name="adj1" fmla="val 1800000"/>
+            </a:avLst>
+          </a:prstGeom>
+          <a:ln w="19050">
+            <a:tailEnd type="triangle"/>
+          </a:ln>
+        </p:spPr>
+        <p:style>
+          <a:lnRef idx="1">
+            <a:schemeClr val="dk1"/>
+          </a:lnRef>
+          <a:fillRef idx="0">
+            <a:schemeClr val="dk1"/>
+          </a:fillRef>
+          <a:effectRef idx="0">
+            <a:schemeClr val="dk1"/>
+          </a:effectRef>
+          <a:fontRef idx="minor">
+            <a:schemeClr val="tx1"/>
+          </a:fontRef>
+        </p:style>
+      </p:cxnSp>
+      <p:sp>
+        <p:nvSpPr>
+          <p:cNvPr id="89" name="TextBox 88"/>
+          <p:cNvSpPr txBox="1"/>
+          <p:nvPr/>
+        </p:nvSpPr>
+        <p:spPr>
+          <a:xfrm rot="5400000">
+            <a:off x="7336313" y="2918888"/>
+            <a:ext cx="457882" cy="338554"/>
+          </a:xfrm>
+          <a:prstGeom prst="rect">
+            <a:avLst/>
+          </a:prstGeom>
+          <a:noFill/>
+          <a:ln w="19050">
+            <a:noFill/>
+          </a:ln>
+        </p:spPr>
+        <p:txBody>
+          <a:bodyPr wrap="none" rtlCol="0">
+            <a:spAutoFit/>
+          </a:bodyPr>
+          <a:lstStyle/>
+          <a:p>
+            <a:r>
+              <a:rPr lang="en-US" sz="1600" dirty="0" smtClean="0"/>
+              <a:t>yes</a:t>
+            </a:r>
+            <a:endParaRPr lang="en-US" sz="1600" dirty="0"/>
+          </a:p>
+        </p:txBody>
+      </p:sp>
+      <p:sp>
+        <p:nvSpPr>
+          <p:cNvPr id="92" name="Rectangle 91"/>
+          <p:cNvSpPr/>
+          <p:nvPr/>
+        </p:nvSpPr>
+        <p:spPr>
+          <a:xfrm>
+            <a:off x="3740489" y="5016397"/>
+            <a:ext cx="3441359" cy="762056"/>
+          </a:xfrm>
+          <a:prstGeom prst="rect">
+            <a:avLst/>
+          </a:prstGeom>
+        </p:spPr>
+        <p:style>
+          <a:lnRef idx="2">
+            <a:schemeClr val="dk1"/>
+          </a:lnRef>
+          <a:fillRef idx="1">
+            <a:schemeClr val="lt1"/>
+          </a:fillRef>
+          <a:effectRef idx="0">
+            <a:schemeClr val="dk1"/>
+          </a:effectRef>
+          <a:fontRef idx="minor">
+            <a:schemeClr val="dk1"/>
+          </a:fontRef>
+        </p:style>
+        <p:txBody>
+          <a:bodyPr rtlCol="0" anchor="ctr"/>
+          <a:lstStyle/>
+          <a:p>
+            <a:pPr algn="ctr"/>
+            <a:r>
+              <a:rPr lang="en-US" dirty="0" smtClean="0"/>
+              <a:t>Wrap the statement with try-catch block and the patching code in catch block</a:t>
+            </a:r>
+            <a:endParaRPr lang="en-US" dirty="0"/>
+          </a:p>
+        </p:txBody>
+      </p:sp>
+      <p:cxnSp>
+        <p:nvCxnSpPr>
+          <p:cNvPr id="94" name="Elbow Connector 93"/>
+          <p:cNvCxnSpPr>
+            <a:stCxn id="65" idx="1"/>
+            <a:endCxn id="92" idx="1"/>
+          </p:cNvCxnSpPr>
+          <p:nvPr/>
+        </p:nvCxnSpPr>
+        <p:spPr>
+          <a:xfrm rot="10800000" flipV="1">
+            <a:off x="3740489" y="2698745"/>
+            <a:ext cx="12700" cy="2698680"/>
+          </a:xfrm>
+          <a:prstGeom prst="bentConnector3">
+            <a:avLst>
+              <a:gd name="adj1" fmla="val 2550000"/>
+            </a:avLst>
+          </a:prstGeom>
+          <a:ln w="19050">
+            <a:tailEnd type="triangle"/>
+          </a:ln>
+        </p:spPr>
+        <p:style>
+          <a:lnRef idx="1">
+            <a:schemeClr val="dk1"/>
+          </a:lnRef>
+          <a:fillRef idx="0">
+            <a:schemeClr val="dk1"/>
+          </a:fillRef>
+          <a:effectRef idx="0">
+            <a:schemeClr val="dk1"/>
+          </a:effectRef>
+          <a:fontRef idx="minor">
+            <a:schemeClr val="tx1"/>
+          </a:fontRef>
+        </p:style>
+      </p:cxnSp>
+      <p:sp>
+        <p:nvSpPr>
+          <p:cNvPr id="96" name="TextBox 95"/>
+          <p:cNvSpPr txBox="1"/>
+          <p:nvPr/>
+        </p:nvSpPr>
+        <p:spPr>
+          <a:xfrm rot="16200000">
+            <a:off x="2185163" y="3901774"/>
+            <a:ext cx="2243048" cy="338554"/>
+          </a:xfrm>
+          <a:prstGeom prst="rect">
+            <a:avLst/>
+          </a:prstGeom>
+          <a:noFill/>
+          <a:ln w="19050">
+            <a:noFill/>
+          </a:ln>
+        </p:spPr>
+        <p:txBody>
+          <a:bodyPr wrap="square" rtlCol="0">
+            <a:spAutoFit/>
+          </a:bodyPr>
+          <a:lstStyle/>
+          <a:p>
+            <a:r>
+              <a:rPr lang="en-US" sz="1600" dirty="0" smtClean="0"/>
+              <a:t>Runtime Exception type</a:t>
+            </a:r>
+            <a:endParaRPr lang="en-US" sz="1600" dirty="0"/>
+          </a:p>
+        </p:txBody>
+      </p:sp>
+      <p:cxnSp>
+        <p:nvCxnSpPr>
+          <p:cNvPr id="97" name="Straight Arrow Connector 96"/>
+          <p:cNvCxnSpPr>
+            <a:stCxn id="86" idx="2"/>
+            <a:endCxn id="92" idx="0"/>
+          </p:cNvCxnSpPr>
+          <p:nvPr/>
+        </p:nvCxnSpPr>
+        <p:spPr>
+          <a:xfrm>
+            <a:off x="5461169" y="4661818"/>
+            <a:ext cx="0" cy="354579"/>
+          </a:xfrm>
+          <a:prstGeom prst="straightConnector1">
+            <a:avLst/>
+          </a:prstGeom>
+          <a:ln w="19050">
+            <a:tailEnd type="triangle"/>
+          </a:ln>
+        </p:spPr>
+        <p:style>
+          <a:lnRef idx="1">
+            <a:schemeClr val="dk1"/>
+          </a:lnRef>
+          <a:fillRef idx="0">
+            <a:schemeClr val="dk1"/>
+          </a:fillRef>
+          <a:effectRef idx="0">
+            <a:schemeClr val="dk1"/>
+          </a:effectRef>
+          <a:fontRef idx="minor">
+            <a:schemeClr val="tx1"/>
+          </a:fontRef>
+        </p:style>
+      </p:cxnSp>
+      <p:cxnSp>
+        <p:nvCxnSpPr>
+          <p:cNvPr id="101" name="Elbow Connector 100"/>
+          <p:cNvCxnSpPr>
+            <a:stCxn id="66" idx="3"/>
+            <a:endCxn id="92" idx="3"/>
+          </p:cNvCxnSpPr>
+          <p:nvPr/>
+        </p:nvCxnSpPr>
+        <p:spPr>
+          <a:xfrm>
+            <a:off x="7181848" y="3554890"/>
+            <a:ext cx="12700" cy="1842535"/>
+          </a:xfrm>
+          <a:prstGeom prst="bentConnector3">
+            <a:avLst>
+              <a:gd name="adj1" fmla="val 2475000"/>
+            </a:avLst>
+          </a:prstGeom>
+          <a:ln w="19050">
+            <a:solidFill>
+              <a:schemeClr val="tx1"/>
+            </a:solidFill>
+            <a:tailEnd type="triangle"/>
+          </a:ln>
+        </p:spPr>
+        <p:style>
+          <a:lnRef idx="1">
+            <a:schemeClr val="dk1"/>
+          </a:lnRef>
+          <a:fillRef idx="0">
+            <a:schemeClr val="dk1"/>
+          </a:fillRef>
+          <a:effectRef idx="0">
+            <a:schemeClr val="dk1"/>
+          </a:effectRef>
+          <a:fontRef idx="minor">
+            <a:schemeClr val="tx1"/>
+          </a:fontRef>
+        </p:style>
+      </p:cxnSp>
+      <p:sp>
+        <p:nvSpPr>
+          <p:cNvPr id="27" name="Rectangle 26"/>
+          <p:cNvSpPr/>
+          <p:nvPr/>
+        </p:nvSpPr>
+        <p:spPr>
+          <a:xfrm>
+            <a:off x="3740489" y="6133031"/>
+            <a:ext cx="3441359" cy="631811"/>
+          </a:xfrm>
+          <a:prstGeom prst="rect">
+            <a:avLst/>
+          </a:prstGeom>
+        </p:spPr>
+        <p:style>
+          <a:lnRef idx="2">
+            <a:schemeClr val="dk1"/>
+          </a:lnRef>
+          <a:fillRef idx="1">
+            <a:schemeClr val="lt1"/>
+          </a:fillRef>
+          <a:effectRef idx="0">
+            <a:schemeClr val="dk1"/>
+          </a:effectRef>
+          <a:fontRef idx="minor">
+            <a:schemeClr val="dk1"/>
+          </a:fontRef>
+        </p:style>
+        <p:txBody>
+          <a:bodyPr rtlCol="0" anchor="ctr"/>
+          <a:lstStyle/>
+          <a:p>
+            <a:pPr algn="ctr"/>
+            <a:r>
+              <a:rPr lang="en-US" dirty="0" smtClean="0"/>
+              <a:t>Instrument the statement to collect dynamic constraints</a:t>
+            </a:r>
+            <a:endParaRPr lang="en-US" dirty="0"/>
+          </a:p>
+        </p:txBody>
+      </p:sp>
+      <p:cxnSp>
+        <p:nvCxnSpPr>
+          <p:cNvPr id="28" name="Straight Arrow Connector 27"/>
+          <p:cNvCxnSpPr>
+            <a:stCxn id="92" idx="2"/>
+            <a:endCxn id="27" idx="0"/>
+          </p:cNvCxnSpPr>
+          <p:nvPr/>
+        </p:nvCxnSpPr>
+        <p:spPr>
+          <a:xfrm>
+            <a:off x="5461169" y="5778453"/>
+            <a:ext cx="0" cy="354578"/>
+          </a:xfrm>
+          <a:prstGeom prst="straightConnector1">
+            <a:avLst/>
+          </a:prstGeom>
+          <a:ln w="19050">
+            <a:tailEnd type="triangle"/>
+          </a:ln>
+        </p:spPr>
+        <p:style>
+          <a:lnRef idx="1">
+            <a:schemeClr val="dk1"/>
+          </a:lnRef>
+          <a:fillRef idx="0">
+            <a:schemeClr val="dk1"/>
+          </a:fillRef>
+          <a:effectRef idx="0">
+            <a:schemeClr val="dk1"/>
+          </a:effectRef>
+          <a:fontRef idx="minor">
+            <a:schemeClr val="tx1"/>
+          </a:fontRef>
+        </p:style>
+      </p:cxnSp>
+      <p:cxnSp>
+        <p:nvCxnSpPr>
+          <p:cNvPr id="13" name="Elbow Connector 12"/>
+          <p:cNvCxnSpPr>
+            <a:stCxn id="27" idx="3"/>
+            <a:endCxn id="92" idx="3"/>
+          </p:cNvCxnSpPr>
+          <p:nvPr/>
+        </p:nvCxnSpPr>
+        <p:spPr>
+          <a:xfrm flipV="1">
+            <a:off x="7181848" y="5397425"/>
+            <a:ext cx="12700" cy="1051512"/>
+          </a:xfrm>
+          <a:prstGeom prst="bentConnector3">
+            <a:avLst>
+              <a:gd name="adj1" fmla="val 4436614"/>
+            </a:avLst>
+          </a:prstGeom>
+          <a:ln w="19050">
+            <a:tailEnd type="triangle"/>
+          </a:ln>
+        </p:spPr>
+        <p:style>
+          <a:lnRef idx="1">
+            <a:schemeClr val="dk1"/>
+          </a:lnRef>
+          <a:fillRef idx="0">
+            <a:schemeClr val="dk1"/>
+          </a:fillRef>
+          <a:effectRef idx="0">
+            <a:schemeClr val="dk1"/>
+          </a:effectRef>
+          <a:fontRef idx="minor">
+            <a:schemeClr val="tx1"/>
+          </a:fontRef>
+        </p:style>
+      </p:cxnSp>
+      <p:sp>
+        <p:nvSpPr>
+          <p:cNvPr id="36" name="TextBox 35"/>
+          <p:cNvSpPr txBox="1"/>
+          <p:nvPr/>
+        </p:nvSpPr>
+        <p:spPr>
+          <a:xfrm rot="5400000">
+            <a:off x="7145323" y="5375482"/>
+            <a:ext cx="1250081" cy="1077218"/>
+          </a:xfrm>
+          <a:prstGeom prst="rect">
+            <a:avLst/>
+          </a:prstGeom>
+          <a:noFill/>
+          <a:ln w="19050">
+            <a:noFill/>
+          </a:ln>
+        </p:spPr>
+        <p:txBody>
+          <a:bodyPr wrap="square" rtlCol="0">
+            <a:spAutoFit/>
+          </a:bodyPr>
+          <a:lstStyle/>
+          <a:p>
+            <a:pPr algn="ctr"/>
+            <a:r>
+              <a:rPr lang="en-US" sz="1600" dirty="0" smtClean="0"/>
+              <a:t>Fallback </a:t>
+            </a:r>
+          </a:p>
+          <a:p>
+            <a:pPr algn="ctr"/>
+            <a:r>
+              <a:rPr lang="en-US" sz="1600" dirty="0" smtClean="0"/>
+              <a:t>insufficient </a:t>
+            </a:r>
+          </a:p>
+          <a:p>
+            <a:pPr algn="ctr"/>
+            <a:r>
+              <a:rPr lang="en-US" sz="1600" dirty="0" smtClean="0"/>
+              <a:t>Constraint</a:t>
+            </a:r>
+          </a:p>
+          <a:p>
+            <a:pPr algn="ctr"/>
+            <a:r>
+              <a:rPr lang="en-US" sz="1600" dirty="0" smtClean="0"/>
+              <a:t> information</a:t>
+            </a:r>
+            <a:endParaRPr lang="en-US" sz="1600" dirty="0"/>
+          </a:p>
+        </p:txBody>
+      </p:sp>
+    </p:spTree>
+    <p:extLst>
+      <p:ext uri="{BB962C8B-B14F-4D97-AF65-F5344CB8AC3E}">
+        <p14:creationId xmlns:p14="http://schemas.microsoft.com/office/powerpoint/2010/main" val="2423475886"/>
+      </p:ext>
+    </p:extLst>
+  </p:cSld>
+  <p:clrMapOvr>
+    <a:masterClrMapping/>
+  </p:clrMapOvr>
+</p:sld>
+</file>
+
 <file path=ppt/slides/slide2.xml><?xml version="1.0" encoding="utf-8"?>
 <p:sld xmlns:a="http://schemas.openxmlformats.org/drawingml/2006/main" xmlns:r="http://schemas.openxmlformats.org/officeDocument/2006/relationships" xmlns:p="http://schemas.openxmlformats.org/presentationml/2006/main">
   <p:cSld>
@@ -6026,6 +7068,86 @@
           </a:p>
         </p:txBody>
       </p:sp>
+      <p:sp>
+        <p:nvSpPr>
+          <p:cNvPr id="24" name="Isosceles Triangle 23"/>
+          <p:cNvSpPr/>
+          <p:nvPr/>
+        </p:nvSpPr>
+        <p:spPr>
+          <a:xfrm rot="10616813">
+            <a:off x="4340850" y="3187326"/>
+            <a:ext cx="157699" cy="135353"/>
+          </a:xfrm>
+          <a:prstGeom prst="triangle">
+            <a:avLst/>
+          </a:prstGeom>
+        </p:spPr>
+        <p:style>
+          <a:lnRef idx="2">
+            <a:schemeClr val="dk1">
+              <a:shade val="50000"/>
+            </a:schemeClr>
+          </a:lnRef>
+          <a:fillRef idx="1">
+            <a:schemeClr val="dk1"/>
+          </a:fillRef>
+          <a:effectRef idx="0">
+            <a:schemeClr val="dk1"/>
+          </a:effectRef>
+          <a:fontRef idx="minor">
+            <a:schemeClr val="lt1"/>
+          </a:fontRef>
+        </p:style>
+        <p:txBody>
+          <a:bodyPr rtlCol="0" anchor="ctr"/>
+          <a:lstStyle/>
+          <a:p>
+            <a:pPr algn="ctr"/>
+            <a:endParaRPr lang="en-US"/>
+          </a:p>
+        </p:txBody>
+      </p:sp>
+      <p:sp>
+        <p:nvSpPr>
+          <p:cNvPr id="27" name="Isosceles Triangle 26"/>
+          <p:cNvSpPr/>
+          <p:nvPr/>
+        </p:nvSpPr>
+        <p:spPr>
+          <a:xfrm rot="5400000">
+            <a:off x="7733826" y="3744203"/>
+            <a:ext cx="157699" cy="135353"/>
+          </a:xfrm>
+          <a:prstGeom prst="triangle">
+            <a:avLst/>
+          </a:prstGeom>
+        </p:spPr>
+        <p:style>
+          <a:lnRef idx="2">
+            <a:schemeClr val="dk1">
+              <a:shade val="50000"/>
+            </a:schemeClr>
+          </a:lnRef>
+          <a:fillRef idx="1">
+            <a:schemeClr val="dk1"/>
+          </a:fillRef>
+          <a:effectRef idx="0">
+            <a:schemeClr val="dk1"/>
+          </a:effectRef>
+          <a:fontRef idx="minor">
+            <a:schemeClr val="lt1"/>
+          </a:fontRef>
+        </p:style>
+        <p:txBody>
+          <a:bodyPr rtlCol="0" anchor="ctr"/>
+          <a:lstStyle/>
+          <a:p>
+            <a:pPr algn="ctr"/>
+            <a:endParaRPr lang="en-US"/>
+          </a:p>
+        </p:txBody>
+      </p:sp>
     </p:spTree>
     <p:extLst>
       <p:ext uri="{BB962C8B-B14F-4D97-AF65-F5344CB8AC3E}">
@@ -6056,6 +7178,1573 @@
           <a:chExt cx="0" cy="0"/>
         </a:xfrm>
       </p:grpSpPr>
+      <p:sp>
+        <p:nvSpPr>
+          <p:cNvPr id="4" name="Oval 3"/>
+          <p:cNvSpPr/>
+          <p:nvPr/>
+        </p:nvSpPr>
+        <p:spPr>
+          <a:xfrm>
+            <a:off x="2477047" y="3141911"/>
+            <a:ext cx="2266205" cy="1339938"/>
+          </a:xfrm>
+          <a:prstGeom prst="ellipse">
+            <a:avLst/>
+          </a:prstGeom>
+          <a:ln w="28575"/>
+        </p:spPr>
+        <p:style>
+          <a:lnRef idx="2">
+            <a:schemeClr val="dk1"/>
+          </a:lnRef>
+          <a:fillRef idx="1">
+            <a:schemeClr val="lt1"/>
+          </a:fillRef>
+          <a:effectRef idx="0">
+            <a:schemeClr val="dk1"/>
+          </a:effectRef>
+          <a:fontRef idx="minor">
+            <a:schemeClr val="dk1"/>
+          </a:fontRef>
+        </p:style>
+        <p:txBody>
+          <a:bodyPr rtlCol="0" anchor="ctr"/>
+          <a:lstStyle/>
+          <a:p>
+            <a:pPr algn="ctr"/>
+            <a:r>
+              <a:rPr lang="en-US" sz="3600" dirty="0" smtClean="0">
+                <a:latin typeface="Consolas" panose="020B0609020204030204" pitchFamily="49" charset="0"/>
+                <a:cs typeface="Consolas" panose="020B0609020204030204" pitchFamily="49" charset="0"/>
+              </a:rPr>
+              <a:t>safe</a:t>
+            </a:r>
+            <a:endParaRPr lang="en-US" sz="2400" dirty="0">
+              <a:latin typeface="Consolas" panose="020B0609020204030204" pitchFamily="49" charset="0"/>
+              <a:cs typeface="Consolas" panose="020B0609020204030204" pitchFamily="49" charset="0"/>
+            </a:endParaRPr>
+          </a:p>
+        </p:txBody>
+      </p:sp>
+      <p:sp>
+        <p:nvSpPr>
+          <p:cNvPr id="5" name="Oval 4"/>
+          <p:cNvSpPr/>
+          <p:nvPr/>
+        </p:nvSpPr>
+        <p:spPr>
+          <a:xfrm>
+            <a:off x="7123481" y="3141911"/>
+            <a:ext cx="2266205" cy="1339938"/>
+          </a:xfrm>
+          <a:prstGeom prst="ellipse">
+            <a:avLst/>
+          </a:prstGeom>
+          <a:ln w="28575"/>
+        </p:spPr>
+        <p:style>
+          <a:lnRef idx="2">
+            <a:schemeClr val="dk1"/>
+          </a:lnRef>
+          <a:fillRef idx="1">
+            <a:schemeClr val="lt1"/>
+          </a:fillRef>
+          <a:effectRef idx="0">
+            <a:schemeClr val="dk1"/>
+          </a:effectRef>
+          <a:fontRef idx="minor">
+            <a:schemeClr val="dk1"/>
+          </a:fontRef>
+        </p:style>
+        <p:txBody>
+          <a:bodyPr rtlCol="0" anchor="ctr"/>
+          <a:lstStyle/>
+          <a:p>
+            <a:pPr algn="ctr"/>
+            <a:r>
+              <a:rPr lang="en-US" sz="3600" dirty="0">
+                <a:latin typeface="Consolas" panose="020B0609020204030204" pitchFamily="49" charset="0"/>
+                <a:cs typeface="Consolas" panose="020B0609020204030204" pitchFamily="49" charset="0"/>
+              </a:rPr>
+              <a:t>e</a:t>
+            </a:r>
+            <a:r>
+              <a:rPr lang="en-US" sz="3600" dirty="0" smtClean="0">
+                <a:latin typeface="Consolas" panose="020B0609020204030204" pitchFamily="49" charset="0"/>
+                <a:cs typeface="Consolas" panose="020B0609020204030204" pitchFamily="49" charset="0"/>
+              </a:rPr>
+              <a:t>rror</a:t>
+            </a:r>
+            <a:endParaRPr lang="en-US" sz="2400" dirty="0">
+              <a:latin typeface="Consolas" panose="020B0609020204030204" pitchFamily="49" charset="0"/>
+              <a:cs typeface="Consolas" panose="020B0609020204030204" pitchFamily="49" charset="0"/>
+            </a:endParaRPr>
+          </a:p>
+        </p:txBody>
+      </p:sp>
+      <p:cxnSp>
+        <p:nvCxnSpPr>
+          <p:cNvPr id="6" name="Curved Connector 5"/>
+          <p:cNvCxnSpPr>
+            <a:stCxn id="4" idx="1"/>
+            <a:endCxn id="4" idx="7"/>
+          </p:cNvCxnSpPr>
+          <p:nvPr/>
+        </p:nvCxnSpPr>
+        <p:spPr>
+          <a:xfrm rot="5400000" flipH="1" flipV="1">
+            <a:off x="3610150" y="2536916"/>
+            <a:ext cx="16648" cy="1602449"/>
+          </a:xfrm>
+          <a:prstGeom prst="curvedConnector3">
+            <a:avLst>
+              <a:gd name="adj1" fmla="val 4001916"/>
+            </a:avLst>
+          </a:prstGeom>
+          <a:ln w="19050">
+            <a:tailEnd type="triangle"/>
+          </a:ln>
+        </p:spPr>
+        <p:style>
+          <a:lnRef idx="1">
+            <a:schemeClr val="dk1"/>
+          </a:lnRef>
+          <a:fillRef idx="0">
+            <a:schemeClr val="dk1"/>
+          </a:fillRef>
+          <a:effectRef idx="0">
+            <a:schemeClr val="dk1"/>
+          </a:effectRef>
+          <a:fontRef idx="minor">
+            <a:schemeClr val="tx1"/>
+          </a:fontRef>
+        </p:style>
+      </p:cxnSp>
+      <p:sp>
+        <p:nvSpPr>
+          <p:cNvPr id="24" name="Isosceles Triangle 23"/>
+          <p:cNvSpPr/>
+          <p:nvPr/>
+        </p:nvSpPr>
+        <p:spPr>
+          <a:xfrm rot="10616813">
+            <a:off x="4340850" y="3187326"/>
+            <a:ext cx="157699" cy="135353"/>
+          </a:xfrm>
+          <a:prstGeom prst="triangle">
+            <a:avLst/>
+          </a:prstGeom>
+        </p:spPr>
+        <p:style>
+          <a:lnRef idx="2">
+            <a:schemeClr val="dk1">
+              <a:shade val="50000"/>
+            </a:schemeClr>
+          </a:lnRef>
+          <a:fillRef idx="1">
+            <a:schemeClr val="dk1"/>
+          </a:fillRef>
+          <a:effectRef idx="0">
+            <a:schemeClr val="dk1"/>
+          </a:effectRef>
+          <a:fontRef idx="minor">
+            <a:schemeClr val="lt1"/>
+          </a:fontRef>
+        </p:style>
+        <p:txBody>
+          <a:bodyPr rtlCol="0" anchor="ctr"/>
+          <a:lstStyle/>
+          <a:p>
+            <a:pPr algn="ctr"/>
+            <a:endParaRPr lang="en-US"/>
+          </a:p>
+        </p:txBody>
+      </p:sp>
+      <p:cxnSp>
+        <p:nvCxnSpPr>
+          <p:cNvPr id="7" name="Straight Arrow Connector 6"/>
+          <p:cNvCxnSpPr>
+            <a:stCxn id="4" idx="6"/>
+            <a:endCxn id="5" idx="2"/>
+          </p:cNvCxnSpPr>
+          <p:nvPr/>
+        </p:nvCxnSpPr>
+        <p:spPr>
+          <a:xfrm>
+            <a:off x="4743252" y="3811880"/>
+            <a:ext cx="2380229" cy="0"/>
+          </a:xfrm>
+          <a:prstGeom prst="straightConnector1">
+            <a:avLst/>
+          </a:prstGeom>
+          <a:ln>
+            <a:tailEnd type="triangle"/>
+          </a:ln>
+        </p:spPr>
+        <p:style>
+          <a:lnRef idx="2">
+            <a:schemeClr val="dk1"/>
+          </a:lnRef>
+          <a:fillRef idx="0">
+            <a:schemeClr val="dk1"/>
+          </a:fillRef>
+          <a:effectRef idx="1">
+            <a:schemeClr val="dk1"/>
+          </a:effectRef>
+          <a:fontRef idx="minor">
+            <a:schemeClr val="tx1"/>
+          </a:fontRef>
+        </p:style>
+      </p:cxnSp>
+      <p:sp>
+        <p:nvSpPr>
+          <p:cNvPr id="27" name="Isosceles Triangle 26"/>
+          <p:cNvSpPr/>
+          <p:nvPr/>
+        </p:nvSpPr>
+        <p:spPr>
+          <a:xfrm rot="5400000">
+            <a:off x="6964950" y="3744203"/>
+            <a:ext cx="157699" cy="135353"/>
+          </a:xfrm>
+          <a:prstGeom prst="triangle">
+            <a:avLst/>
+          </a:prstGeom>
+        </p:spPr>
+        <p:style>
+          <a:lnRef idx="2">
+            <a:schemeClr val="dk1">
+              <a:shade val="50000"/>
+            </a:schemeClr>
+          </a:lnRef>
+          <a:fillRef idx="1">
+            <a:schemeClr val="dk1"/>
+          </a:fillRef>
+          <a:effectRef idx="0">
+            <a:schemeClr val="dk1"/>
+          </a:effectRef>
+          <a:fontRef idx="minor">
+            <a:schemeClr val="lt1"/>
+          </a:fontRef>
+        </p:style>
+        <p:txBody>
+          <a:bodyPr rtlCol="0" anchor="ctr"/>
+          <a:lstStyle/>
+          <a:p>
+            <a:pPr algn="ctr"/>
+            <a:endParaRPr lang="en-US"/>
+          </a:p>
+        </p:txBody>
+      </p:sp>
+      <mc:AlternateContent xmlns:mc="http://schemas.openxmlformats.org/markup-compatibility/2006">
+        <mc:Choice xmlns:a14="http://schemas.microsoft.com/office/drawing/2010/main" Requires="a14">
+          <p:sp>
+            <p:nvSpPr>
+              <p:cNvPr id="21" name="TextBox 20"/>
+              <p:cNvSpPr txBox="1"/>
+              <p:nvPr/>
+            </p:nvSpPr>
+            <p:spPr>
+              <a:xfrm>
+                <a:off x="2635221" y="2278632"/>
+                <a:ext cx="1966506" cy="461665"/>
+              </a:xfrm>
+              <a:prstGeom prst="rect">
+                <a:avLst/>
+              </a:prstGeom>
+              <a:noFill/>
+            </p:spPr>
+            <p:txBody>
+              <a:bodyPr wrap="square" rtlCol="0">
+                <a:spAutoFit/>
+              </a:bodyPr>
+              <a:lstStyle/>
+              <a:p>
+                <a:pPr/>
+                <a14:m>
+                  <m:oMathPara xmlns:m="http://schemas.openxmlformats.org/officeDocument/2006/math">
+                    <m:oMathParaPr>
+                      <m:jc m:val="centerGroup"/>
+                    </m:oMathParaPr>
+                    <m:oMath xmlns:m="http://schemas.openxmlformats.org/officeDocument/2006/math">
+                      <m:r>
+                        <a:rPr lang="en-US" sz="2400" b="0" i="1" smtClean="0">
+                          <a:latin typeface="Cambria Math" panose="02040503050406030204" pitchFamily="18" charset="0"/>
+                        </a:rPr>
+                        <m:t>(</m:t>
+                      </m:r>
+                      <m:sSub>
+                        <m:sSubPr>
+                          <m:ctrlPr>
+                            <a:rPr lang="en-US" sz="2400" b="0" i="1" smtClean="0">
+                              <a:latin typeface="Cambria Math" panose="02040503050406030204" pitchFamily="18" charset="0"/>
+                            </a:rPr>
+                          </m:ctrlPr>
+                        </m:sSubPr>
+                        <m:e>
+                          <m:r>
+                            <a:rPr lang="en-US" sz="2400" b="0" i="1" smtClean="0">
+                              <a:latin typeface="Cambria Math" panose="02040503050406030204" pitchFamily="18" charset="0"/>
+                            </a:rPr>
+                            <m:t>𝜁</m:t>
+                          </m:r>
+                        </m:e>
+                        <m:sub>
+                          <m:r>
+                            <a:rPr lang="en-US" sz="2400" b="0" i="1" smtClean="0">
+                              <a:latin typeface="Cambria Math" panose="02040503050406030204" pitchFamily="18" charset="0"/>
+                            </a:rPr>
+                            <m:t>1</m:t>
+                          </m:r>
+                        </m:sub>
+                      </m:sSub>
+                      <m:r>
+                        <a:rPr lang="en-US" sz="2400" b="0" i="1" smtClean="0">
+                          <a:latin typeface="Cambria Math" panose="02040503050406030204" pitchFamily="18" charset="0"/>
+                        </a:rPr>
+                        <m:t>,</m:t>
+                      </m:r>
+                      <m:sSub>
+                        <m:sSubPr>
+                          <m:ctrlPr>
+                            <a:rPr lang="en-US" sz="2400" b="0" i="1" smtClean="0">
+                              <a:latin typeface="Cambria Math" panose="02040503050406030204" pitchFamily="18" charset="0"/>
+                            </a:rPr>
+                          </m:ctrlPr>
+                        </m:sSubPr>
+                        <m:e>
+                          <m:r>
+                            <a:rPr lang="en-US" sz="2400" b="0" i="1" smtClean="0">
+                              <a:latin typeface="Cambria Math" panose="02040503050406030204" pitchFamily="18" charset="0"/>
+                            </a:rPr>
+                            <m:t>𝜂</m:t>
+                          </m:r>
+                        </m:e>
+                        <m:sub>
+                          <m:r>
+                            <a:rPr lang="en-US" sz="2400" b="0" i="1" smtClean="0">
+                              <a:latin typeface="Cambria Math" panose="02040503050406030204" pitchFamily="18" charset="0"/>
+                            </a:rPr>
+                            <m:t>1</m:t>
+                          </m:r>
+                        </m:sub>
+                      </m:sSub>
+                      <m:r>
+                        <a:rPr lang="en-US" sz="2400" b="0" i="1" smtClean="0">
+                          <a:latin typeface="Cambria Math" panose="02040503050406030204" pitchFamily="18" charset="0"/>
+                        </a:rPr>
+                        <m:t>,</m:t>
+                      </m:r>
+                      <m:sSub>
+                        <m:sSubPr>
+                          <m:ctrlPr>
+                            <a:rPr lang="en-US" sz="2400" b="0" i="1" smtClean="0">
+                              <a:latin typeface="Cambria Math" panose="02040503050406030204" pitchFamily="18" charset="0"/>
+                            </a:rPr>
+                          </m:ctrlPr>
+                        </m:sSubPr>
+                        <m:e>
+                          <m:r>
+                            <a:rPr lang="en-US" sz="2400" b="0" i="1" smtClean="0">
+                              <a:latin typeface="Cambria Math" panose="02040503050406030204" pitchFamily="18" charset="0"/>
+                            </a:rPr>
+                            <m:t>𝜆</m:t>
+                          </m:r>
+                        </m:e>
+                        <m:sub>
+                          <m:r>
+                            <a:rPr lang="en-US" sz="2400" b="0" i="1" smtClean="0">
+                              <a:latin typeface="Cambria Math" panose="02040503050406030204" pitchFamily="18" charset="0"/>
+                            </a:rPr>
+                            <m:t>1</m:t>
+                          </m:r>
+                        </m:sub>
+                      </m:sSub>
+                      <m:r>
+                        <a:rPr lang="en-US" sz="2400" b="0" i="1" smtClean="0">
+                          <a:latin typeface="Cambria Math" panose="02040503050406030204" pitchFamily="18" charset="0"/>
+                        </a:rPr>
+                        <m:t>)</m:t>
+                      </m:r>
+                    </m:oMath>
+                  </m:oMathPara>
+                </a14:m>
+                <a:endParaRPr lang="en-US" sz="2400" dirty="0"/>
+              </a:p>
+            </p:txBody>
+          </p:sp>
+        </mc:Choice>
+        <mc:Fallback>
+          <p:sp>
+            <p:nvSpPr>
+              <p:cNvPr id="21" name="TextBox 20"/>
+              <p:cNvSpPr txBox="1">
+                <a:spLocks noRot="1" noChangeAspect="1" noMove="1" noResize="1" noEditPoints="1" noAdjustHandles="1" noChangeArrowheads="1" noChangeShapeType="1" noTextEdit="1"/>
+              </p:cNvSpPr>
+              <p:nvPr/>
+            </p:nvSpPr>
+            <p:spPr>
+              <a:xfrm>
+                <a:off x="2635221" y="2278632"/>
+                <a:ext cx="1966506" cy="461665"/>
+              </a:xfrm>
+              <a:prstGeom prst="rect">
+                <a:avLst/>
+              </a:prstGeom>
+              <a:blipFill rotWithShape="0">
+                <a:blip r:embed="rId2"/>
+                <a:stretch>
+                  <a:fillRect b="-17105"/>
+                </a:stretch>
+              </a:blipFill>
+            </p:spPr>
+            <p:txBody>
+              <a:bodyPr/>
+              <a:lstStyle/>
+              <a:p>
+                <a:r>
+                  <a:rPr lang="en-US">
+                    <a:noFill/>
+                  </a:rPr>
+                  <a:t> </a:t>
+                </a:r>
+              </a:p>
+            </p:txBody>
+          </p:sp>
+        </mc:Fallback>
+      </mc:AlternateContent>
+      <p:cxnSp>
+        <p:nvCxnSpPr>
+          <p:cNvPr id="3" name="Straight Arrow Connector 2"/>
+          <p:cNvCxnSpPr>
+            <a:endCxn id="4" idx="2"/>
+          </p:cNvCxnSpPr>
+          <p:nvPr/>
+        </p:nvCxnSpPr>
+        <p:spPr>
+          <a:xfrm>
+            <a:off x="2203450" y="3811880"/>
+            <a:ext cx="273597" cy="0"/>
+          </a:xfrm>
+          <a:prstGeom prst="straightConnector1">
+            <a:avLst/>
+          </a:prstGeom>
+          <a:ln w="19050">
+            <a:tailEnd type="triangle"/>
+          </a:ln>
+        </p:spPr>
+        <p:style>
+          <a:lnRef idx="1">
+            <a:schemeClr val="dk1"/>
+          </a:lnRef>
+          <a:fillRef idx="0">
+            <a:schemeClr val="dk1"/>
+          </a:fillRef>
+          <a:effectRef idx="0">
+            <a:schemeClr val="dk1"/>
+          </a:effectRef>
+          <a:fontRef idx="minor">
+            <a:schemeClr val="tx1"/>
+          </a:fontRef>
+        </p:style>
+      </p:cxnSp>
+      <p:sp>
+        <p:nvSpPr>
+          <p:cNvPr id="16" name="Isosceles Triangle 15"/>
+          <p:cNvSpPr/>
+          <p:nvPr/>
+        </p:nvSpPr>
+        <p:spPr>
+          <a:xfrm rot="5400000">
+            <a:off x="2317943" y="3744202"/>
+            <a:ext cx="157699" cy="135353"/>
+          </a:xfrm>
+          <a:prstGeom prst="triangle">
+            <a:avLst/>
+          </a:prstGeom>
+        </p:spPr>
+        <p:style>
+          <a:lnRef idx="2">
+            <a:schemeClr val="dk1">
+              <a:shade val="50000"/>
+            </a:schemeClr>
+          </a:lnRef>
+          <a:fillRef idx="1">
+            <a:schemeClr val="dk1"/>
+          </a:fillRef>
+          <a:effectRef idx="0">
+            <a:schemeClr val="dk1"/>
+          </a:effectRef>
+          <a:fontRef idx="minor">
+            <a:schemeClr val="lt1"/>
+          </a:fontRef>
+        </p:style>
+        <p:txBody>
+          <a:bodyPr rtlCol="0" anchor="ctr"/>
+          <a:lstStyle/>
+          <a:p>
+            <a:pPr algn="ctr"/>
+            <a:endParaRPr lang="en-US"/>
+          </a:p>
+        </p:txBody>
+      </p:sp>
+      <p:cxnSp>
+        <p:nvCxnSpPr>
+          <p:cNvPr id="17" name="Curved Connector 16"/>
+          <p:cNvCxnSpPr/>
+          <p:nvPr/>
+        </p:nvCxnSpPr>
+        <p:spPr>
+          <a:xfrm rot="5400000" flipH="1" flipV="1">
+            <a:off x="3610151" y="2510427"/>
+            <a:ext cx="16648" cy="1602449"/>
+          </a:xfrm>
+          <a:prstGeom prst="curvedConnector3">
+            <a:avLst>
+              <a:gd name="adj1" fmla="val 9685181"/>
+            </a:avLst>
+          </a:prstGeom>
+          <a:ln w="19050">
+            <a:tailEnd type="triangle"/>
+          </a:ln>
+        </p:spPr>
+        <p:style>
+          <a:lnRef idx="1">
+            <a:schemeClr val="dk1"/>
+          </a:lnRef>
+          <a:fillRef idx="0">
+            <a:schemeClr val="dk1"/>
+          </a:fillRef>
+          <a:effectRef idx="0">
+            <a:schemeClr val="dk1"/>
+          </a:effectRef>
+          <a:fontRef idx="minor">
+            <a:schemeClr val="tx1"/>
+          </a:fontRef>
+        </p:style>
+      </p:cxnSp>
+      <mc:AlternateContent xmlns:mc="http://schemas.openxmlformats.org/markup-compatibility/2006">
+        <mc:Choice xmlns:a14="http://schemas.microsoft.com/office/drawing/2010/main" Requires="a14">
+          <p:sp>
+            <p:nvSpPr>
+              <p:cNvPr id="20" name="TextBox 19"/>
+              <p:cNvSpPr txBox="1"/>
+              <p:nvPr/>
+            </p:nvSpPr>
+            <p:spPr>
+              <a:xfrm>
+                <a:off x="2686021" y="1253937"/>
+                <a:ext cx="1966506" cy="461665"/>
+              </a:xfrm>
+              <a:prstGeom prst="rect">
+                <a:avLst/>
+              </a:prstGeom>
+              <a:noFill/>
+            </p:spPr>
+            <p:txBody>
+              <a:bodyPr wrap="square" rtlCol="0">
+                <a:spAutoFit/>
+              </a:bodyPr>
+              <a:lstStyle/>
+              <a:p>
+                <a:pPr/>
+                <a14:m>
+                  <m:oMathPara xmlns:m="http://schemas.openxmlformats.org/officeDocument/2006/math">
+                    <m:oMathParaPr>
+                      <m:jc m:val="centerGroup"/>
+                    </m:oMathParaPr>
+                    <m:oMath xmlns:m="http://schemas.openxmlformats.org/officeDocument/2006/math">
+                      <m:r>
+                        <a:rPr lang="en-US" sz="2400" b="0" i="1" smtClean="0">
+                          <a:latin typeface="Cambria Math" panose="02040503050406030204" pitchFamily="18" charset="0"/>
+                        </a:rPr>
+                        <m:t>(</m:t>
+                      </m:r>
+                      <m:sSub>
+                        <m:sSubPr>
+                          <m:ctrlPr>
+                            <a:rPr lang="en-US" sz="2400" b="0" i="1" smtClean="0">
+                              <a:latin typeface="Cambria Math" panose="02040503050406030204" pitchFamily="18" charset="0"/>
+                            </a:rPr>
+                          </m:ctrlPr>
+                        </m:sSubPr>
+                        <m:e>
+                          <m:r>
+                            <a:rPr lang="en-US" sz="2400" b="0" i="1" smtClean="0">
+                              <a:latin typeface="Cambria Math" panose="02040503050406030204" pitchFamily="18" charset="0"/>
+                            </a:rPr>
+                            <m:t>𝜁</m:t>
+                          </m:r>
+                        </m:e>
+                        <m:sub>
+                          <m:r>
+                            <a:rPr lang="en-US" sz="2400" b="0" i="1" smtClean="0">
+                              <a:latin typeface="Cambria Math" panose="02040503050406030204" pitchFamily="18" charset="0"/>
+                            </a:rPr>
+                            <m:t>𝑛</m:t>
+                          </m:r>
+                        </m:sub>
+                      </m:sSub>
+                      <m:r>
+                        <a:rPr lang="en-US" sz="2400" b="0" i="1" smtClean="0">
+                          <a:latin typeface="Cambria Math" panose="02040503050406030204" pitchFamily="18" charset="0"/>
+                        </a:rPr>
+                        <m:t>,</m:t>
+                      </m:r>
+                      <m:sSub>
+                        <m:sSubPr>
+                          <m:ctrlPr>
+                            <a:rPr lang="en-US" sz="2400" b="0" i="1" smtClean="0">
+                              <a:latin typeface="Cambria Math" panose="02040503050406030204" pitchFamily="18" charset="0"/>
+                            </a:rPr>
+                          </m:ctrlPr>
+                        </m:sSubPr>
+                        <m:e>
+                          <m:r>
+                            <a:rPr lang="en-US" sz="2400" b="0" i="1" smtClean="0">
+                              <a:latin typeface="Cambria Math" panose="02040503050406030204" pitchFamily="18" charset="0"/>
+                            </a:rPr>
+                            <m:t>𝜂</m:t>
+                          </m:r>
+                        </m:e>
+                        <m:sub>
+                          <m:r>
+                            <a:rPr lang="en-US" sz="2400" b="0" i="1" smtClean="0">
+                              <a:latin typeface="Cambria Math" panose="02040503050406030204" pitchFamily="18" charset="0"/>
+                            </a:rPr>
+                            <m:t>𝑛</m:t>
+                          </m:r>
+                        </m:sub>
+                      </m:sSub>
+                      <m:r>
+                        <a:rPr lang="en-US" sz="2400" b="0" i="1" smtClean="0">
+                          <a:latin typeface="Cambria Math" panose="02040503050406030204" pitchFamily="18" charset="0"/>
+                        </a:rPr>
+                        <m:t>,</m:t>
+                      </m:r>
+                      <m:sSub>
+                        <m:sSubPr>
+                          <m:ctrlPr>
+                            <a:rPr lang="en-US" sz="2400" b="0" i="1" smtClean="0">
+                              <a:latin typeface="Cambria Math" panose="02040503050406030204" pitchFamily="18" charset="0"/>
+                            </a:rPr>
+                          </m:ctrlPr>
+                        </m:sSubPr>
+                        <m:e>
+                          <m:r>
+                            <a:rPr lang="en-US" sz="2400" b="0" i="1" smtClean="0">
+                              <a:latin typeface="Cambria Math" panose="02040503050406030204" pitchFamily="18" charset="0"/>
+                            </a:rPr>
+                            <m:t>𝜆</m:t>
+                          </m:r>
+                        </m:e>
+                        <m:sub>
+                          <m:r>
+                            <a:rPr lang="en-US" sz="2400" b="0" i="1" smtClean="0">
+                              <a:latin typeface="Cambria Math" panose="02040503050406030204" pitchFamily="18" charset="0"/>
+                            </a:rPr>
+                            <m:t>𝑛</m:t>
+                          </m:r>
+                        </m:sub>
+                      </m:sSub>
+                      <m:r>
+                        <a:rPr lang="en-US" sz="2400" b="0" i="1" smtClean="0">
+                          <a:latin typeface="Cambria Math" panose="02040503050406030204" pitchFamily="18" charset="0"/>
+                        </a:rPr>
+                        <m:t>)</m:t>
+                      </m:r>
+                    </m:oMath>
+                  </m:oMathPara>
+                </a14:m>
+                <a:endParaRPr lang="en-US" sz="2400" dirty="0"/>
+              </a:p>
+            </p:txBody>
+          </p:sp>
+        </mc:Choice>
+        <mc:Fallback>
+          <p:sp>
+            <p:nvSpPr>
+              <p:cNvPr id="20" name="TextBox 19"/>
+              <p:cNvSpPr txBox="1">
+                <a:spLocks noRot="1" noChangeAspect="1" noMove="1" noResize="1" noEditPoints="1" noAdjustHandles="1" noChangeArrowheads="1" noChangeShapeType="1" noTextEdit="1"/>
+              </p:cNvSpPr>
+              <p:nvPr/>
+            </p:nvSpPr>
+            <p:spPr>
+              <a:xfrm>
+                <a:off x="2686021" y="1253937"/>
+                <a:ext cx="1966506" cy="461665"/>
+              </a:xfrm>
+              <a:prstGeom prst="rect">
+                <a:avLst/>
+              </a:prstGeom>
+              <a:blipFill rotWithShape="0">
+                <a:blip r:embed="rId3"/>
+                <a:stretch>
+                  <a:fillRect b="-18667"/>
+                </a:stretch>
+              </a:blipFill>
+            </p:spPr>
+            <p:txBody>
+              <a:bodyPr/>
+              <a:lstStyle/>
+              <a:p>
+                <a:r>
+                  <a:rPr lang="en-US">
+                    <a:noFill/>
+                  </a:rPr>
+                  <a:t> </a:t>
+                </a:r>
+              </a:p>
+            </p:txBody>
+          </p:sp>
+        </mc:Fallback>
+      </mc:AlternateContent>
+      <p:cxnSp>
+        <p:nvCxnSpPr>
+          <p:cNvPr id="25" name="Curved Connector 24"/>
+          <p:cNvCxnSpPr/>
+          <p:nvPr/>
+        </p:nvCxnSpPr>
+        <p:spPr>
+          <a:xfrm rot="5400000" flipH="1" flipV="1">
+            <a:off x="3610151" y="2543722"/>
+            <a:ext cx="16648" cy="1602449"/>
+          </a:xfrm>
+          <a:prstGeom prst="curvedConnector3">
+            <a:avLst>
+              <a:gd name="adj1" fmla="val 8960470"/>
+            </a:avLst>
+          </a:prstGeom>
+          <a:ln w="19050">
+            <a:prstDash val="dash"/>
+            <a:tailEnd type="triangle"/>
+          </a:ln>
+        </p:spPr>
+        <p:style>
+          <a:lnRef idx="1">
+            <a:schemeClr val="dk1"/>
+          </a:lnRef>
+          <a:fillRef idx="0">
+            <a:schemeClr val="dk1"/>
+          </a:fillRef>
+          <a:effectRef idx="0">
+            <a:schemeClr val="dk1"/>
+          </a:effectRef>
+          <a:fontRef idx="minor">
+            <a:schemeClr val="tx1"/>
+          </a:fontRef>
+        </p:style>
+      </p:cxnSp>
+      <mc:AlternateContent xmlns:mc="http://schemas.openxmlformats.org/markup-compatibility/2006">
+        <mc:Choice xmlns:a14="http://schemas.microsoft.com/office/drawing/2010/main" Requires="a14">
+          <p:sp>
+            <p:nvSpPr>
+              <p:cNvPr id="30" name="TextBox 29"/>
+              <p:cNvSpPr txBox="1"/>
+              <p:nvPr/>
+            </p:nvSpPr>
+            <p:spPr>
+              <a:xfrm>
+                <a:off x="4812952" y="3353271"/>
+                <a:ext cx="1966506" cy="461665"/>
+              </a:xfrm>
+              <a:prstGeom prst="rect">
+                <a:avLst/>
+              </a:prstGeom>
+              <a:noFill/>
+            </p:spPr>
+            <p:txBody>
+              <a:bodyPr wrap="square" rtlCol="0">
+                <a:spAutoFit/>
+              </a:bodyPr>
+              <a:lstStyle/>
+              <a:p>
+                <a:pPr/>
+                <a14:m>
+                  <m:oMathPara xmlns:m="http://schemas.openxmlformats.org/officeDocument/2006/math">
+                    <m:oMathParaPr>
+                      <m:jc m:val="centerGroup"/>
+                    </m:oMathParaPr>
+                    <m:oMath xmlns:m="http://schemas.openxmlformats.org/officeDocument/2006/math">
+                      <m:r>
+                        <a:rPr lang="en-US" sz="2400" b="0" i="1" smtClean="0">
+                          <a:latin typeface="Cambria Math" panose="02040503050406030204" pitchFamily="18" charset="0"/>
+                        </a:rPr>
+                        <m:t>𝑜𝑡h𝑒𝑟</m:t>
+                      </m:r>
+                    </m:oMath>
+                  </m:oMathPara>
+                </a14:m>
+                <a:endParaRPr lang="en-US" sz="2400" dirty="0"/>
+              </a:p>
+            </p:txBody>
+          </p:sp>
+        </mc:Choice>
+        <mc:Fallback>
+          <p:sp>
+            <p:nvSpPr>
+              <p:cNvPr id="30" name="TextBox 29"/>
+              <p:cNvSpPr txBox="1">
+                <a:spLocks noRot="1" noChangeAspect="1" noMove="1" noResize="1" noEditPoints="1" noAdjustHandles="1" noChangeArrowheads="1" noChangeShapeType="1" noTextEdit="1"/>
+              </p:cNvSpPr>
+              <p:nvPr/>
+            </p:nvSpPr>
+            <p:spPr>
+              <a:xfrm>
+                <a:off x="4812952" y="3353271"/>
+                <a:ext cx="1966506" cy="461665"/>
+              </a:xfrm>
+              <a:prstGeom prst="rect">
+                <a:avLst/>
+              </a:prstGeom>
+              <a:blipFill rotWithShape="0">
+                <a:blip r:embed="rId4"/>
+                <a:stretch>
+                  <a:fillRect/>
+                </a:stretch>
+              </a:blipFill>
+            </p:spPr>
+            <p:txBody>
+              <a:bodyPr/>
+              <a:lstStyle/>
+              <a:p>
+                <a:r>
+                  <a:rPr lang="en-US">
+                    <a:noFill/>
+                  </a:rPr>
+                  <a:t> </a:t>
+                </a:r>
+              </a:p>
+            </p:txBody>
+          </p:sp>
+        </mc:Fallback>
+      </mc:AlternateContent>
+    </p:spTree>
+    <p:extLst>
+      <p:ext uri="{BB962C8B-B14F-4D97-AF65-F5344CB8AC3E}">
+        <p14:creationId xmlns:p14="http://schemas.microsoft.com/office/powerpoint/2010/main" val="2744836178"/>
+      </p:ext>
+    </p:extLst>
+  </p:cSld>
+  <p:clrMapOvr>
+    <a:masterClrMapping/>
+  </p:clrMapOvr>
+</p:sld>
+</file>
+
+<file path=ppt/slides/slide6.xml><?xml version="1.0" encoding="utf-8"?>
+<p:sld xmlns:a="http://schemas.openxmlformats.org/drawingml/2006/main" xmlns:r="http://schemas.openxmlformats.org/officeDocument/2006/relationships" xmlns:p="http://schemas.openxmlformats.org/presentationml/2006/main">
+  <p:cSld>
+    <p:spTree>
+      <p:nvGrpSpPr>
+        <p:cNvPr id="1" name=""/>
+        <p:cNvGrpSpPr/>
+        <p:nvPr/>
+      </p:nvGrpSpPr>
+      <p:grpSpPr>
+        <a:xfrm>
+          <a:off x="0" y="0"/>
+          <a:ext cx="0" cy="0"/>
+          <a:chOff x="0" y="0"/>
+          <a:chExt cx="0" cy="0"/>
+        </a:xfrm>
+      </p:grpSpPr>
+      <p:sp>
+        <p:nvSpPr>
+          <p:cNvPr id="4" name="Oval 3"/>
+          <p:cNvSpPr/>
+          <p:nvPr/>
+        </p:nvSpPr>
+        <p:spPr>
+          <a:xfrm>
+            <a:off x="2477047" y="3141911"/>
+            <a:ext cx="2266205" cy="1339938"/>
+          </a:xfrm>
+          <a:prstGeom prst="ellipse">
+            <a:avLst/>
+          </a:prstGeom>
+          <a:ln w="28575"/>
+        </p:spPr>
+        <p:style>
+          <a:lnRef idx="2">
+            <a:schemeClr val="dk1"/>
+          </a:lnRef>
+          <a:fillRef idx="1">
+            <a:schemeClr val="lt1"/>
+          </a:fillRef>
+          <a:effectRef idx="0">
+            <a:schemeClr val="dk1"/>
+          </a:effectRef>
+          <a:fontRef idx="minor">
+            <a:schemeClr val="dk1"/>
+          </a:fontRef>
+        </p:style>
+        <p:txBody>
+          <a:bodyPr rtlCol="0" anchor="ctr"/>
+          <a:lstStyle/>
+          <a:p>
+            <a:pPr algn="ctr"/>
+            <a:r>
+              <a:rPr lang="en-US" sz="3600" dirty="0" smtClean="0">
+                <a:latin typeface="Consolas" panose="020B0609020204030204" pitchFamily="49" charset="0"/>
+                <a:cs typeface="Consolas" panose="020B0609020204030204" pitchFamily="49" charset="0"/>
+              </a:rPr>
+              <a:t>safe</a:t>
+            </a:r>
+            <a:endParaRPr lang="en-US" sz="2400" dirty="0">
+              <a:latin typeface="Consolas" panose="020B0609020204030204" pitchFamily="49" charset="0"/>
+              <a:cs typeface="Consolas" panose="020B0609020204030204" pitchFamily="49" charset="0"/>
+            </a:endParaRPr>
+          </a:p>
+        </p:txBody>
+      </p:sp>
+      <p:sp>
+        <p:nvSpPr>
+          <p:cNvPr id="5" name="Oval 4"/>
+          <p:cNvSpPr/>
+          <p:nvPr/>
+        </p:nvSpPr>
+        <p:spPr>
+          <a:xfrm>
+            <a:off x="7123481" y="3141911"/>
+            <a:ext cx="2266205" cy="1339938"/>
+          </a:xfrm>
+          <a:prstGeom prst="ellipse">
+            <a:avLst/>
+          </a:prstGeom>
+          <a:ln w="28575"/>
+        </p:spPr>
+        <p:style>
+          <a:lnRef idx="2">
+            <a:schemeClr val="dk1"/>
+          </a:lnRef>
+          <a:fillRef idx="1">
+            <a:schemeClr val="lt1"/>
+          </a:fillRef>
+          <a:effectRef idx="0">
+            <a:schemeClr val="dk1"/>
+          </a:effectRef>
+          <a:fontRef idx="minor">
+            <a:schemeClr val="dk1"/>
+          </a:fontRef>
+        </p:style>
+        <p:txBody>
+          <a:bodyPr rtlCol="0" anchor="ctr"/>
+          <a:lstStyle/>
+          <a:p>
+            <a:pPr algn="ctr"/>
+            <a:r>
+              <a:rPr lang="en-US" sz="3600" dirty="0">
+                <a:latin typeface="Consolas" panose="020B0609020204030204" pitchFamily="49" charset="0"/>
+                <a:cs typeface="Consolas" panose="020B0609020204030204" pitchFamily="49" charset="0"/>
+              </a:rPr>
+              <a:t>e</a:t>
+            </a:r>
+            <a:r>
+              <a:rPr lang="en-US" sz="3600" dirty="0" smtClean="0">
+                <a:latin typeface="Consolas" panose="020B0609020204030204" pitchFamily="49" charset="0"/>
+                <a:cs typeface="Consolas" panose="020B0609020204030204" pitchFamily="49" charset="0"/>
+              </a:rPr>
+              <a:t>rror</a:t>
+            </a:r>
+            <a:endParaRPr lang="en-US" sz="2400" dirty="0">
+              <a:latin typeface="Consolas" panose="020B0609020204030204" pitchFamily="49" charset="0"/>
+              <a:cs typeface="Consolas" panose="020B0609020204030204" pitchFamily="49" charset="0"/>
+            </a:endParaRPr>
+          </a:p>
+        </p:txBody>
+      </p:sp>
+      <p:cxnSp>
+        <p:nvCxnSpPr>
+          <p:cNvPr id="6" name="Curved Connector 5"/>
+          <p:cNvCxnSpPr>
+            <a:stCxn id="4" idx="1"/>
+            <a:endCxn id="4" idx="7"/>
+          </p:cNvCxnSpPr>
+          <p:nvPr/>
+        </p:nvCxnSpPr>
+        <p:spPr>
+          <a:xfrm rot="5400000" flipH="1" flipV="1">
+            <a:off x="3610150" y="2536916"/>
+            <a:ext cx="16648" cy="1602449"/>
+          </a:xfrm>
+          <a:prstGeom prst="curvedConnector3">
+            <a:avLst>
+              <a:gd name="adj1" fmla="val 4001916"/>
+            </a:avLst>
+          </a:prstGeom>
+          <a:ln w="19050">
+            <a:tailEnd type="triangle"/>
+          </a:ln>
+        </p:spPr>
+        <p:style>
+          <a:lnRef idx="1">
+            <a:schemeClr val="dk1"/>
+          </a:lnRef>
+          <a:fillRef idx="0">
+            <a:schemeClr val="dk1"/>
+          </a:fillRef>
+          <a:effectRef idx="0">
+            <a:schemeClr val="dk1"/>
+          </a:effectRef>
+          <a:fontRef idx="minor">
+            <a:schemeClr val="tx1"/>
+          </a:fontRef>
+        </p:style>
+      </p:cxnSp>
+      <p:sp>
+        <p:nvSpPr>
+          <p:cNvPr id="24" name="Isosceles Triangle 23"/>
+          <p:cNvSpPr/>
+          <p:nvPr/>
+        </p:nvSpPr>
+        <p:spPr>
+          <a:xfrm rot="10616813">
+            <a:off x="4340850" y="3187326"/>
+            <a:ext cx="157699" cy="135353"/>
+          </a:xfrm>
+          <a:prstGeom prst="triangle">
+            <a:avLst/>
+          </a:prstGeom>
+        </p:spPr>
+        <p:style>
+          <a:lnRef idx="2">
+            <a:schemeClr val="dk1">
+              <a:shade val="50000"/>
+            </a:schemeClr>
+          </a:lnRef>
+          <a:fillRef idx="1">
+            <a:schemeClr val="dk1"/>
+          </a:fillRef>
+          <a:effectRef idx="0">
+            <a:schemeClr val="dk1"/>
+          </a:effectRef>
+          <a:fontRef idx="minor">
+            <a:schemeClr val="lt1"/>
+          </a:fontRef>
+        </p:style>
+        <p:txBody>
+          <a:bodyPr rtlCol="0" anchor="ctr"/>
+          <a:lstStyle/>
+          <a:p>
+            <a:pPr algn="ctr"/>
+            <a:endParaRPr lang="en-US"/>
+          </a:p>
+        </p:txBody>
+      </p:sp>
+      <p:cxnSp>
+        <p:nvCxnSpPr>
+          <p:cNvPr id="7" name="Straight Arrow Connector 6"/>
+          <p:cNvCxnSpPr>
+            <a:stCxn id="4" idx="6"/>
+            <a:endCxn id="5" idx="2"/>
+          </p:cNvCxnSpPr>
+          <p:nvPr/>
+        </p:nvCxnSpPr>
+        <p:spPr>
+          <a:xfrm>
+            <a:off x="4743252" y="3811880"/>
+            <a:ext cx="2380229" cy="0"/>
+          </a:xfrm>
+          <a:prstGeom prst="straightConnector1">
+            <a:avLst/>
+          </a:prstGeom>
+          <a:ln>
+            <a:tailEnd type="triangle"/>
+          </a:ln>
+        </p:spPr>
+        <p:style>
+          <a:lnRef idx="2">
+            <a:schemeClr val="dk1"/>
+          </a:lnRef>
+          <a:fillRef idx="0">
+            <a:schemeClr val="dk1"/>
+          </a:fillRef>
+          <a:effectRef idx="1">
+            <a:schemeClr val="dk1"/>
+          </a:effectRef>
+          <a:fontRef idx="minor">
+            <a:schemeClr val="tx1"/>
+          </a:fontRef>
+        </p:style>
+      </p:cxnSp>
+      <p:sp>
+        <p:nvSpPr>
+          <p:cNvPr id="27" name="Isosceles Triangle 26"/>
+          <p:cNvSpPr/>
+          <p:nvPr/>
+        </p:nvSpPr>
+        <p:spPr>
+          <a:xfrm rot="5400000">
+            <a:off x="6964950" y="3744203"/>
+            <a:ext cx="157699" cy="135353"/>
+          </a:xfrm>
+          <a:prstGeom prst="triangle">
+            <a:avLst/>
+          </a:prstGeom>
+        </p:spPr>
+        <p:style>
+          <a:lnRef idx="2">
+            <a:schemeClr val="dk1">
+              <a:shade val="50000"/>
+            </a:schemeClr>
+          </a:lnRef>
+          <a:fillRef idx="1">
+            <a:schemeClr val="dk1"/>
+          </a:fillRef>
+          <a:effectRef idx="0">
+            <a:schemeClr val="dk1"/>
+          </a:effectRef>
+          <a:fontRef idx="minor">
+            <a:schemeClr val="lt1"/>
+          </a:fontRef>
+        </p:style>
+        <p:txBody>
+          <a:bodyPr rtlCol="0" anchor="ctr"/>
+          <a:lstStyle/>
+          <a:p>
+            <a:pPr algn="ctr"/>
+            <a:endParaRPr lang="en-US"/>
+          </a:p>
+        </p:txBody>
+      </p:sp>
+      <mc:AlternateContent xmlns:mc="http://schemas.openxmlformats.org/markup-compatibility/2006">
+        <mc:Choice xmlns:a14="http://schemas.microsoft.com/office/drawing/2010/main" Requires="a14">
+          <p:sp>
+            <p:nvSpPr>
+              <p:cNvPr id="21" name="TextBox 20"/>
+              <p:cNvSpPr txBox="1"/>
+              <p:nvPr/>
+            </p:nvSpPr>
+            <p:spPr>
+              <a:xfrm>
+                <a:off x="1993984" y="1547499"/>
+                <a:ext cx="4686746" cy="1200329"/>
+              </a:xfrm>
+              <a:prstGeom prst="rect">
+                <a:avLst/>
+              </a:prstGeom>
+              <a:noFill/>
+            </p:spPr>
+            <p:txBody>
+              <a:bodyPr wrap="square" rtlCol="0">
+                <a:spAutoFit/>
+              </a:bodyPr>
+              <a:lstStyle/>
+              <a:p>
+                <a:pPr/>
+                <a14:m>
+                  <m:oMathPara xmlns:m="http://schemas.openxmlformats.org/officeDocument/2006/math">
+                    <m:oMathParaPr>
+                      <m:jc m:val="centerGroup"/>
+                    </m:oMathParaPr>
+                    <m:oMath xmlns:m="http://schemas.openxmlformats.org/officeDocument/2006/math">
+                      <m:r>
+                        <a:rPr lang="en-US" sz="2400" b="0" i="1" smtClean="0">
+                          <a:latin typeface="Cambria Math" panose="02040503050406030204" pitchFamily="18" charset="0"/>
+                        </a:rPr>
+                        <m:t>(</m:t>
+                      </m:r>
+                      <m:r>
+                        <a:rPr lang="en-US" sz="2400" b="0" i="1" smtClean="0">
+                          <a:latin typeface="Cambria Math" panose="02040503050406030204" pitchFamily="18" charset="0"/>
+                        </a:rPr>
+                        <m:t>𝑠𝑢𝑏𝑠𝑡𝑟𝑖𝑛𝑔</m:t>
+                      </m:r>
+                      <m:r>
+                        <a:rPr lang="en-US" sz="2400" b="0" i="1" smtClean="0">
+                          <a:latin typeface="Cambria Math" panose="02040503050406030204" pitchFamily="18" charset="0"/>
+                        </a:rPr>
+                        <m:t>(</m:t>
+                      </m:r>
+                      <m:r>
+                        <a:rPr lang="en-US" sz="2400" b="0" i="1" smtClean="0">
+                          <a:latin typeface="Cambria Math" panose="02040503050406030204" pitchFamily="18" charset="0"/>
+                        </a:rPr>
+                        <m:t>𝑖</m:t>
+                      </m:r>
+                      <m:r>
+                        <a:rPr lang="en-US" sz="2400" b="0" i="1" smtClean="0">
+                          <a:latin typeface="Cambria Math" panose="02040503050406030204" pitchFamily="18" charset="0"/>
+                        </a:rPr>
+                        <m:t>,</m:t>
+                      </m:r>
+                      <m:r>
+                        <a:rPr lang="en-US" sz="2400" b="0" i="1" smtClean="0">
+                          <a:latin typeface="Cambria Math" panose="02040503050406030204" pitchFamily="18" charset="0"/>
+                        </a:rPr>
+                        <m:t>𝑗</m:t>
+                      </m:r>
+                      <m:r>
+                        <a:rPr lang="en-US" sz="2400" b="0" i="1" smtClean="0">
+                          <a:latin typeface="Cambria Math" panose="02040503050406030204" pitchFamily="18" charset="0"/>
+                        </a:rPr>
+                        <m:t>),</m:t>
+                      </m:r>
+                    </m:oMath>
+                  </m:oMathPara>
+                </a14:m>
+                <a:endParaRPr lang="en-US" sz="2400" b="0" i="1" dirty="0" smtClean="0">
+                  <a:latin typeface="Cambria Math" panose="02040503050406030204" pitchFamily="18" charset="0"/>
+                </a:endParaRPr>
+              </a:p>
+              <a:p>
+                <a:pPr/>
+                <a14:m>
+                  <m:oMathPara xmlns:m="http://schemas.openxmlformats.org/officeDocument/2006/math">
+                    <m:oMathParaPr>
+                      <m:jc m:val="centerGroup"/>
+                    </m:oMathParaPr>
+                    <m:oMath xmlns:m="http://schemas.openxmlformats.org/officeDocument/2006/math">
+                      <m:r>
+                        <a:rPr lang="en-US" sz="2400" b="0" i="1" smtClean="0">
+                          <a:latin typeface="Cambria Math" panose="02040503050406030204" pitchFamily="18" charset="0"/>
+                        </a:rPr>
+                        <m:t>𝐼𝑛𝑑𝑒𝑥𝑂𝑢𝑡𝑂𝑓𝐵𝑜𝑢𝑛𝑑𝐸𝑥𝑐𝑒𝑝𝑡𝑖𝑜𝑛</m:t>
+                      </m:r>
+                      <m:r>
+                        <a:rPr lang="en-US" sz="2400" b="0" i="1" smtClean="0">
+                          <a:latin typeface="Cambria Math" panose="02040503050406030204" pitchFamily="18" charset="0"/>
+                        </a:rPr>
+                        <m:t>,</m:t>
+                      </m:r>
+                      <m:r>
+                        <a:rPr lang="en-US" sz="2400" b="0" i="1" smtClean="0">
+                          <a:latin typeface="Cambria Math" panose="02040503050406030204" pitchFamily="18" charset="0"/>
+                        </a:rPr>
+                        <m:t> </m:t>
+                      </m:r>
+                    </m:oMath>
+                  </m:oMathPara>
+                </a14:m>
+                <a:endParaRPr lang="en-US" sz="2400" b="0" i="1" dirty="0" smtClean="0">
+                  <a:latin typeface="Cambria Math" panose="02040503050406030204" pitchFamily="18" charset="0"/>
+                </a:endParaRPr>
+              </a:p>
+              <a:p>
+                <a:pPr/>
+                <a14:m>
+                  <m:oMathPara xmlns:m="http://schemas.openxmlformats.org/officeDocument/2006/math">
+                    <m:oMathParaPr>
+                      <m:jc m:val="centerGroup"/>
+                    </m:oMathParaPr>
+                    <m:oMath xmlns:m="http://schemas.openxmlformats.org/officeDocument/2006/math">
+                      <m:r>
+                        <a:rPr lang="en-US" sz="2400" b="0" i="1" smtClean="0">
+                          <a:latin typeface="Cambria Math" panose="02040503050406030204" pitchFamily="18" charset="0"/>
+                        </a:rPr>
+                        <m:t>{</m:t>
+                      </m:r>
+                      <m:r>
+                        <a:rPr lang="en-US" sz="2400" b="0" i="1" smtClean="0">
+                          <a:latin typeface="Cambria Math" panose="02040503050406030204" pitchFamily="18" charset="0"/>
+                        </a:rPr>
+                        <m:t>𝑠𝑡𝑟𝑖𝑛𝑔</m:t>
+                      </m:r>
+                      <m:r>
+                        <a:rPr lang="en-US" sz="2400" b="0" i="1" smtClean="0">
+                          <a:latin typeface="Cambria Math" panose="02040503050406030204" pitchFamily="18" charset="0"/>
+                        </a:rPr>
+                        <m:t> </m:t>
+                      </m:r>
+                      <m:r>
+                        <a:rPr lang="en-US" sz="2400" b="0" i="1" smtClean="0">
+                          <a:latin typeface="Cambria Math" panose="02040503050406030204" pitchFamily="18" charset="0"/>
+                        </a:rPr>
+                        <m:t>𝑙𝑒𝑛𝑔𝑡h</m:t>
+                      </m:r>
+                      <m:r>
+                        <a:rPr lang="en-US" sz="2400" b="0" i="1" smtClean="0">
+                          <a:latin typeface="Cambria Math" panose="02040503050406030204" pitchFamily="18" charset="0"/>
+                        </a:rPr>
+                        <m:t>&gt;</m:t>
+                      </m:r>
+                      <m:r>
+                        <a:rPr lang="en-US" sz="2400" b="0" i="1" smtClean="0">
+                          <a:latin typeface="Cambria Math" panose="02040503050406030204" pitchFamily="18" charset="0"/>
+                        </a:rPr>
+                        <m:t>𝑖</m:t>
+                      </m:r>
+                      <m:r>
+                        <a:rPr lang="en-US" sz="2400" b="0" i="1" smtClean="0">
+                          <a:latin typeface="Cambria Math" panose="02040503050406030204" pitchFamily="18" charset="0"/>
+                        </a:rPr>
+                        <m:t>,</m:t>
+                      </m:r>
+                      <m:r>
+                        <a:rPr lang="en-US" sz="2400" b="0" i="1" smtClean="0">
+                          <a:latin typeface="Cambria Math" panose="02040503050406030204" pitchFamily="18" charset="0"/>
+                        </a:rPr>
+                        <m:t>𝑗</m:t>
+                      </m:r>
+                      <m:r>
+                        <a:rPr lang="en-US" sz="2400" b="0" i="1" smtClean="0">
+                          <a:latin typeface="Cambria Math" panose="02040503050406030204" pitchFamily="18" charset="0"/>
+                        </a:rPr>
+                        <m:t>≥0, </m:t>
+                      </m:r>
+                      <m:r>
+                        <a:rPr lang="en-US" sz="2400" b="0" i="1" smtClean="0">
+                          <a:latin typeface="Cambria Math" panose="02040503050406030204" pitchFamily="18" charset="0"/>
+                        </a:rPr>
+                        <m:t>𝑖</m:t>
+                      </m:r>
+                      <m:r>
+                        <a:rPr lang="en-US" sz="2400" b="0" i="1" smtClean="0">
+                          <a:latin typeface="Cambria Math" panose="02040503050406030204" pitchFamily="18" charset="0"/>
+                        </a:rPr>
+                        <m:t>≤</m:t>
+                      </m:r>
+                      <m:r>
+                        <a:rPr lang="en-US" sz="2400" b="0" i="1" smtClean="0">
+                          <a:latin typeface="Cambria Math" panose="02040503050406030204" pitchFamily="18" charset="0"/>
+                        </a:rPr>
+                        <m:t>𝑗</m:t>
+                      </m:r>
+                      <m:r>
+                        <a:rPr lang="en-US" sz="2400" b="0" i="1" smtClean="0">
+                          <a:latin typeface="Cambria Math" panose="02040503050406030204" pitchFamily="18" charset="0"/>
+                        </a:rPr>
+                        <m:t>})</m:t>
+                      </m:r>
+                    </m:oMath>
+                  </m:oMathPara>
+                </a14:m>
+                <a:endParaRPr lang="en-US" sz="2400" dirty="0"/>
+              </a:p>
+            </p:txBody>
+          </p:sp>
+        </mc:Choice>
+        <mc:Fallback>
+          <p:sp>
+            <p:nvSpPr>
+              <p:cNvPr id="21" name="TextBox 20"/>
+              <p:cNvSpPr txBox="1">
+                <a:spLocks noRot="1" noChangeAspect="1" noMove="1" noResize="1" noEditPoints="1" noAdjustHandles="1" noChangeArrowheads="1" noChangeShapeType="1" noTextEdit="1"/>
+              </p:cNvSpPr>
+              <p:nvPr/>
+            </p:nvSpPr>
+            <p:spPr>
+              <a:xfrm>
+                <a:off x="1993984" y="1547499"/>
+                <a:ext cx="4686746" cy="1200329"/>
+              </a:xfrm>
+              <a:prstGeom prst="rect">
+                <a:avLst/>
+              </a:prstGeom>
+              <a:blipFill rotWithShape="0">
+                <a:blip r:embed="rId2"/>
+                <a:stretch>
+                  <a:fillRect b="-6091"/>
+                </a:stretch>
+              </a:blipFill>
+            </p:spPr>
+            <p:txBody>
+              <a:bodyPr/>
+              <a:lstStyle/>
+              <a:p>
+                <a:r>
+                  <a:rPr lang="en-US">
+                    <a:noFill/>
+                  </a:rPr>
+                  <a:t> </a:t>
+                </a:r>
+              </a:p>
+            </p:txBody>
+          </p:sp>
+        </mc:Fallback>
+      </mc:AlternateContent>
+      <p:cxnSp>
+        <p:nvCxnSpPr>
+          <p:cNvPr id="3" name="Straight Arrow Connector 2"/>
+          <p:cNvCxnSpPr>
+            <a:endCxn id="4" idx="2"/>
+          </p:cNvCxnSpPr>
+          <p:nvPr/>
+        </p:nvCxnSpPr>
+        <p:spPr>
+          <a:xfrm>
+            <a:off x="2203450" y="3811880"/>
+            <a:ext cx="273597" cy="0"/>
+          </a:xfrm>
+          <a:prstGeom prst="straightConnector1">
+            <a:avLst/>
+          </a:prstGeom>
+          <a:ln w="19050">
+            <a:tailEnd type="triangle"/>
+          </a:ln>
+        </p:spPr>
+        <p:style>
+          <a:lnRef idx="1">
+            <a:schemeClr val="dk1"/>
+          </a:lnRef>
+          <a:fillRef idx="0">
+            <a:schemeClr val="dk1"/>
+          </a:fillRef>
+          <a:effectRef idx="0">
+            <a:schemeClr val="dk1"/>
+          </a:effectRef>
+          <a:fontRef idx="minor">
+            <a:schemeClr val="tx1"/>
+          </a:fontRef>
+        </p:style>
+      </p:cxnSp>
+      <p:sp>
+        <p:nvSpPr>
+          <p:cNvPr id="16" name="Isosceles Triangle 15"/>
+          <p:cNvSpPr/>
+          <p:nvPr/>
+        </p:nvSpPr>
+        <p:spPr>
+          <a:xfrm rot="5400000">
+            <a:off x="2317943" y="3744202"/>
+            <a:ext cx="157699" cy="135353"/>
+          </a:xfrm>
+          <a:prstGeom prst="triangle">
+            <a:avLst/>
+          </a:prstGeom>
+        </p:spPr>
+        <p:style>
+          <a:lnRef idx="2">
+            <a:schemeClr val="dk1">
+              <a:shade val="50000"/>
+            </a:schemeClr>
+          </a:lnRef>
+          <a:fillRef idx="1">
+            <a:schemeClr val="dk1"/>
+          </a:fillRef>
+          <a:effectRef idx="0">
+            <a:schemeClr val="dk1"/>
+          </a:effectRef>
+          <a:fontRef idx="minor">
+            <a:schemeClr val="lt1"/>
+          </a:fontRef>
+        </p:style>
+        <p:txBody>
+          <a:bodyPr rtlCol="0" anchor="ctr"/>
+          <a:lstStyle/>
+          <a:p>
+            <a:pPr algn="ctr"/>
+            <a:endParaRPr lang="en-US"/>
+          </a:p>
+        </p:txBody>
+      </p:sp>
+      <mc:AlternateContent xmlns:mc="http://schemas.openxmlformats.org/markup-compatibility/2006">
+        <mc:Choice xmlns:a14="http://schemas.microsoft.com/office/drawing/2010/main" Requires="a14">
+          <p:sp>
+            <p:nvSpPr>
+              <p:cNvPr id="30" name="TextBox 29"/>
+              <p:cNvSpPr txBox="1"/>
+              <p:nvPr/>
+            </p:nvSpPr>
+            <p:spPr>
+              <a:xfrm>
+                <a:off x="4812952" y="3353271"/>
+                <a:ext cx="1966506" cy="461665"/>
+              </a:xfrm>
+              <a:prstGeom prst="rect">
+                <a:avLst/>
+              </a:prstGeom>
+              <a:noFill/>
+            </p:spPr>
+            <p:txBody>
+              <a:bodyPr wrap="square" rtlCol="0">
+                <a:spAutoFit/>
+              </a:bodyPr>
+              <a:lstStyle/>
+              <a:p>
+                <a:pPr/>
+                <a14:m>
+                  <m:oMathPara xmlns:m="http://schemas.openxmlformats.org/officeDocument/2006/math">
+                    <m:oMathParaPr>
+                      <m:jc m:val="centerGroup"/>
+                    </m:oMathParaPr>
+                    <m:oMath xmlns:m="http://schemas.openxmlformats.org/officeDocument/2006/math">
+                      <m:r>
+                        <a:rPr lang="en-US" sz="2400" b="0" i="1" smtClean="0">
+                          <a:latin typeface="Cambria Math" panose="02040503050406030204" pitchFamily="18" charset="0"/>
+                        </a:rPr>
+                        <m:t>𝑜𝑡h𝑒𝑟</m:t>
+                      </m:r>
+                    </m:oMath>
+                  </m:oMathPara>
+                </a14:m>
+                <a:endParaRPr lang="en-US" sz="2400" dirty="0"/>
+              </a:p>
+            </p:txBody>
+          </p:sp>
+        </mc:Choice>
+        <mc:Fallback>
+          <p:sp>
+            <p:nvSpPr>
+              <p:cNvPr id="30" name="TextBox 29"/>
+              <p:cNvSpPr txBox="1">
+                <a:spLocks noRot="1" noChangeAspect="1" noMove="1" noResize="1" noEditPoints="1" noAdjustHandles="1" noChangeArrowheads="1" noChangeShapeType="1" noTextEdit="1"/>
+              </p:cNvSpPr>
+              <p:nvPr/>
+            </p:nvSpPr>
+            <p:spPr>
+              <a:xfrm>
+                <a:off x="4812952" y="3353271"/>
+                <a:ext cx="1966506" cy="461665"/>
+              </a:xfrm>
+              <a:prstGeom prst="rect">
+                <a:avLst/>
+              </a:prstGeom>
+              <a:blipFill rotWithShape="0">
+                <a:blip r:embed="rId3"/>
+                <a:stretch>
+                  <a:fillRect/>
+                </a:stretch>
+              </a:blipFill>
+            </p:spPr>
+            <p:txBody>
+              <a:bodyPr/>
+              <a:lstStyle/>
+              <a:p>
+                <a:r>
+                  <a:rPr lang="en-US">
+                    <a:noFill/>
+                  </a:rPr>
+                  <a:t> </a:t>
+                </a:r>
+              </a:p>
+            </p:txBody>
+          </p:sp>
+        </mc:Fallback>
+      </mc:AlternateContent>
+    </p:spTree>
+    <p:extLst>
+      <p:ext uri="{BB962C8B-B14F-4D97-AF65-F5344CB8AC3E}">
+        <p14:creationId xmlns:p14="http://schemas.microsoft.com/office/powerpoint/2010/main" val="22946444"/>
+      </p:ext>
+    </p:extLst>
+  </p:cSld>
+  <p:clrMapOvr>
+    <a:masterClrMapping/>
+  </p:clrMapOvr>
+</p:sld>
+</file>
+
+<file path=ppt/slides/slide7.xml><?xml version="1.0" encoding="utf-8"?>
+<p:sld xmlns:a="http://schemas.openxmlformats.org/drawingml/2006/main" xmlns:r="http://schemas.openxmlformats.org/officeDocument/2006/relationships" xmlns:p="http://schemas.openxmlformats.org/presentationml/2006/main">
+  <p:cSld>
+    <p:spTree>
+      <p:nvGrpSpPr>
+        <p:cNvPr id="1" name=""/>
+        <p:cNvGrpSpPr/>
+        <p:nvPr/>
+      </p:nvGrpSpPr>
+      <p:grpSpPr>
+        <a:xfrm>
+          <a:off x="0" y="0"/>
+          <a:ext cx="0" cy="0"/>
+          <a:chOff x="0" y="0"/>
+          <a:chExt cx="0" cy="0"/>
+        </a:xfrm>
+      </p:grpSpPr>
       <p:graphicFrame>
         <p:nvGraphicFramePr>
           <p:cNvPr id="6" name="Object 5"/>
@@ -6065,7 +8754,7 @@
           <p:nvPr>
             <p:extLst>
               <p:ext uri="{D42A27DB-BD31-4B8C-83A1-F6EECF244321}">
-                <p14:modId xmlns:p14="http://schemas.microsoft.com/office/powerpoint/2010/main" val="3341619923"/>
+                <p14:modId xmlns:p14="http://schemas.microsoft.com/office/powerpoint/2010/main" val="4063020326"/>
               </p:ext>
             </p:extLst>
           </p:nvPr>
@@ -6078,7 +8767,7 @@
           <a:graphicData uri="http://schemas.openxmlformats.org/presentationml/2006/ole">
             <mc:AlternateContent xmlns:mc="http://schemas.openxmlformats.org/markup-compatibility/2006">
               <mc:Choice xmlns:v="urn:schemas-microsoft-com:vml" Requires="v">
-                <p:oleObj spid="_x0000_s1034" name="Visio" r:id="rId3" imgW="3752882" imgH="4562496" progId="Visio.Drawing.15">
+                <p:oleObj spid="_x0000_s1083" name="Visio" r:id="rId3" imgW="3752882" imgH="4562496" progId="Visio.Drawing.15">
                   <p:embed/>
                 </p:oleObj>
               </mc:Choice>
@@ -6126,7 +8815,7 @@
 </p:sld>
 </file>
 
-<file path=ppt/slides/slide6.xml><?xml version="1.0" encoding="utf-8"?>
+<file path=ppt/slides/slide8.xml><?xml version="1.0" encoding="utf-8"?>
 <p:sld xmlns:a="http://schemas.openxmlformats.org/drawingml/2006/main" xmlns:r="http://schemas.openxmlformats.org/officeDocument/2006/relationships" xmlns:p="http://schemas.openxmlformats.org/presentationml/2006/main">
   <p:cSld>
     <p:spTree>
@@ -6143,627 +8832,659 @@
           <a:chExt cx="0" cy="0"/>
         </a:xfrm>
       </p:grpSpPr>
-      <p:sp>
-        <p:nvSpPr>
-          <p:cNvPr id="4" name="Rectangle 3"/>
-          <p:cNvSpPr/>
-          <p:nvPr/>
-        </p:nvSpPr>
+      <p:pic>
+        <p:nvPicPr>
+          <p:cNvPr id="4" name="Picture 3"/>
+          <p:cNvPicPr>
+            <a:picLocks noChangeAspect="1"/>
+          </p:cNvPicPr>
+          <p:nvPr/>
+        </p:nvPicPr>
+        <p:blipFill>
+          <a:blip r:embed="rId2"/>
+          <a:stretch>
+            <a:fillRect/>
+          </a:stretch>
+        </p:blipFill>
         <p:spPr>
           <a:xfrm>
-            <a:off x="164757" y="2983124"/>
-            <a:ext cx="11590637" cy="427340"/>
+            <a:off x="1466850" y="1368643"/>
+            <a:ext cx="9837788" cy="4108232"/>
           </a:xfrm>
           <a:prstGeom prst="rect">
             <a:avLst/>
           </a:prstGeom>
         </p:spPr>
-        <p:style>
-          <a:lnRef idx="2">
-            <a:schemeClr val="dk1"/>
-          </a:lnRef>
-          <a:fillRef idx="1">
-            <a:schemeClr val="lt1"/>
-          </a:fillRef>
-          <a:effectRef idx="0">
-            <a:schemeClr val="dk1"/>
-          </a:effectRef>
-          <a:fontRef idx="minor">
-            <a:schemeClr val="dk1"/>
-          </a:fontRef>
-        </p:style>
-        <p:txBody>
-          <a:bodyPr rtlCol="0" anchor="ctr"/>
-          <a:lstStyle/>
-          <a:p>
-            <a:pPr algn="ctr"/>
-            <a:endParaRPr lang="en-US"/>
-          </a:p>
-        </p:txBody>
-      </p:sp>
-      <p:sp>
-        <p:nvSpPr>
-          <p:cNvPr id="5" name="TextBox 4"/>
-          <p:cNvSpPr txBox="1"/>
-          <p:nvPr/>
-        </p:nvSpPr>
-        <p:spPr>
-          <a:xfrm>
-            <a:off x="131805" y="3012128"/>
-            <a:ext cx="1952367" cy="369332"/>
-          </a:xfrm>
-          <a:prstGeom prst="rect">
-            <a:avLst/>
-          </a:prstGeom>
-          <a:noFill/>
-        </p:spPr>
-        <p:txBody>
-          <a:bodyPr wrap="square" rtlCol="0">
-            <a:spAutoFit/>
-          </a:bodyPr>
-          <a:lstStyle/>
-          <a:p>
-            <a:r>
-              <a:rPr lang="en-US" dirty="0" smtClean="0">
-                <a:latin typeface="Consolas" panose="020B0609020204030204" pitchFamily="49" charset="0"/>
-                <a:cs typeface="Consolas" panose="020B0609020204030204" pitchFamily="49" charset="0"/>
-              </a:rPr>
-              <a:t>Minimum length</a:t>
-            </a:r>
-            <a:endParaRPr lang="en-US" dirty="0">
-              <a:latin typeface="Consolas" panose="020B0609020204030204" pitchFamily="49" charset="0"/>
-              <a:cs typeface="Consolas" panose="020B0609020204030204" pitchFamily="49" charset="0"/>
-            </a:endParaRPr>
-          </a:p>
-        </p:txBody>
-      </p:sp>
-      <p:cxnSp>
-        <p:nvCxnSpPr>
-          <p:cNvPr id="7" name="Straight Connector 6"/>
-          <p:cNvCxnSpPr/>
-          <p:nvPr/>
-        </p:nvCxnSpPr>
-        <p:spPr>
-          <a:xfrm>
-            <a:off x="2042984" y="2983124"/>
-            <a:ext cx="0" cy="427340"/>
-          </a:xfrm>
-          <a:prstGeom prst="line">
-            <a:avLst/>
-          </a:prstGeom>
-          <a:ln w="12700"/>
-        </p:spPr>
-        <p:style>
-          <a:lnRef idx="1">
-            <a:schemeClr val="dk1"/>
-          </a:lnRef>
-          <a:fillRef idx="0">
-            <a:schemeClr val="dk1"/>
-          </a:fillRef>
-          <a:effectRef idx="0">
-            <a:schemeClr val="dk1"/>
-          </a:effectRef>
-          <a:fontRef idx="minor">
-            <a:schemeClr val="tx1"/>
-          </a:fontRef>
-        </p:style>
-      </p:cxnSp>
-      <p:sp>
-        <p:nvSpPr>
-          <p:cNvPr id="10" name="TextBox 9"/>
-          <p:cNvSpPr txBox="1"/>
-          <p:nvPr/>
-        </p:nvSpPr>
-        <p:spPr>
-          <a:xfrm>
-            <a:off x="2042983" y="3012128"/>
-            <a:ext cx="2479589" cy="369332"/>
-          </a:xfrm>
-          <a:prstGeom prst="rect">
-            <a:avLst/>
-          </a:prstGeom>
-          <a:noFill/>
-        </p:spPr>
-        <p:txBody>
-          <a:bodyPr wrap="square" rtlCol="0">
-            <a:spAutoFit/>
-          </a:bodyPr>
-          <a:lstStyle/>
-          <a:p>
-            <a:r>
-              <a:rPr lang="en-US" dirty="0" smtClean="0">
-                <a:latin typeface="Consolas" panose="020B0609020204030204" pitchFamily="49" charset="0"/>
-                <a:cs typeface="Consolas" panose="020B0609020204030204" pitchFamily="49" charset="0"/>
-              </a:rPr>
-              <a:t>Maximum length(L)</a:t>
-            </a:r>
-            <a:endParaRPr lang="en-US" dirty="0">
-              <a:latin typeface="Consolas" panose="020B0609020204030204" pitchFamily="49" charset="0"/>
-              <a:cs typeface="Consolas" panose="020B0609020204030204" pitchFamily="49" charset="0"/>
-            </a:endParaRPr>
-          </a:p>
-        </p:txBody>
-      </p:sp>
-      <p:cxnSp>
-        <p:nvCxnSpPr>
-          <p:cNvPr id="11" name="Straight Connector 10"/>
-          <p:cNvCxnSpPr/>
-          <p:nvPr/>
-        </p:nvCxnSpPr>
-        <p:spPr>
-          <a:xfrm>
-            <a:off x="4300155" y="2983124"/>
-            <a:ext cx="0" cy="427340"/>
-          </a:xfrm>
-          <a:prstGeom prst="line">
-            <a:avLst/>
-          </a:prstGeom>
-          <a:ln w="12700"/>
-        </p:spPr>
-        <p:style>
-          <a:lnRef idx="1">
-            <a:schemeClr val="dk1"/>
-          </a:lnRef>
-          <a:fillRef idx="0">
-            <a:schemeClr val="dk1"/>
-          </a:fillRef>
-          <a:effectRef idx="0">
-            <a:schemeClr val="dk1"/>
-          </a:effectRef>
-          <a:fontRef idx="minor">
-            <a:schemeClr val="tx1"/>
-          </a:fontRef>
-        </p:style>
-      </p:cxnSp>
-      <p:sp>
-        <p:nvSpPr>
-          <p:cNvPr id="12" name="TextBox 11"/>
-          <p:cNvSpPr txBox="1"/>
-          <p:nvPr/>
-        </p:nvSpPr>
-        <p:spPr>
-          <a:xfrm>
-            <a:off x="4300155" y="3012128"/>
-            <a:ext cx="1210962" cy="369332"/>
-          </a:xfrm>
-          <a:prstGeom prst="rect">
-            <a:avLst/>
-          </a:prstGeom>
-          <a:noFill/>
-        </p:spPr>
-        <p:txBody>
-          <a:bodyPr wrap="square" rtlCol="0">
-            <a:spAutoFit/>
-          </a:bodyPr>
-          <a:lstStyle/>
-          <a:p>
-            <a:r>
-              <a:rPr lang="en-US" dirty="0" smtClean="0">
-                <a:latin typeface="Consolas" panose="020B0609020204030204" pitchFamily="49" charset="0"/>
-                <a:cs typeface="Consolas" panose="020B0609020204030204" pitchFamily="49" charset="0"/>
-              </a:rPr>
-              <a:t>Prefix 1</a:t>
-            </a:r>
-            <a:endParaRPr lang="en-US" dirty="0">
-              <a:latin typeface="Consolas" panose="020B0609020204030204" pitchFamily="49" charset="0"/>
-              <a:cs typeface="Consolas" panose="020B0609020204030204" pitchFamily="49" charset="0"/>
-            </a:endParaRPr>
-          </a:p>
-        </p:txBody>
-      </p:sp>
-      <p:cxnSp>
-        <p:nvCxnSpPr>
-          <p:cNvPr id="13" name="Straight Connector 12"/>
-          <p:cNvCxnSpPr/>
-          <p:nvPr/>
-        </p:nvCxnSpPr>
-        <p:spPr>
-          <a:xfrm>
-            <a:off x="5511117" y="2983124"/>
-            <a:ext cx="0" cy="427340"/>
-          </a:xfrm>
-          <a:prstGeom prst="line">
-            <a:avLst/>
-          </a:prstGeom>
-          <a:ln w="12700"/>
-        </p:spPr>
-        <p:style>
-          <a:lnRef idx="1">
-            <a:schemeClr val="dk1"/>
-          </a:lnRef>
-          <a:fillRef idx="0">
-            <a:schemeClr val="dk1"/>
-          </a:fillRef>
-          <a:effectRef idx="0">
-            <a:schemeClr val="dk1"/>
-          </a:effectRef>
-          <a:fontRef idx="minor">
-            <a:schemeClr val="tx1"/>
-          </a:fontRef>
-        </p:style>
-      </p:cxnSp>
-      <p:sp>
-        <p:nvSpPr>
-          <p:cNvPr id="14" name="TextBox 13"/>
-          <p:cNvSpPr txBox="1"/>
-          <p:nvPr/>
-        </p:nvSpPr>
-        <p:spPr>
-          <a:xfrm>
-            <a:off x="5511116" y="3012128"/>
-            <a:ext cx="1210962" cy="369332"/>
-          </a:xfrm>
-          <a:prstGeom prst="rect">
-            <a:avLst/>
-          </a:prstGeom>
-          <a:noFill/>
-        </p:spPr>
-        <p:txBody>
-          <a:bodyPr wrap="square" rtlCol="0">
-            <a:spAutoFit/>
-          </a:bodyPr>
-          <a:lstStyle/>
-          <a:p>
-            <a:r>
-              <a:rPr lang="en-US" dirty="0" smtClean="0">
-                <a:latin typeface="Consolas" panose="020B0609020204030204" pitchFamily="49" charset="0"/>
-                <a:cs typeface="Consolas" panose="020B0609020204030204" pitchFamily="49" charset="0"/>
-              </a:rPr>
-              <a:t>Prefix 2</a:t>
-            </a:r>
-            <a:endParaRPr lang="en-US" dirty="0">
-              <a:latin typeface="Consolas" panose="020B0609020204030204" pitchFamily="49" charset="0"/>
-              <a:cs typeface="Consolas" panose="020B0609020204030204" pitchFamily="49" charset="0"/>
-            </a:endParaRPr>
-          </a:p>
-        </p:txBody>
-      </p:sp>
-      <p:cxnSp>
-        <p:nvCxnSpPr>
-          <p:cNvPr id="15" name="Straight Connector 14"/>
-          <p:cNvCxnSpPr/>
-          <p:nvPr/>
-        </p:nvCxnSpPr>
-        <p:spPr>
-          <a:xfrm>
-            <a:off x="6647935" y="2983124"/>
-            <a:ext cx="0" cy="427340"/>
-          </a:xfrm>
-          <a:prstGeom prst="line">
-            <a:avLst/>
-          </a:prstGeom>
-          <a:ln w="12700"/>
-        </p:spPr>
-        <p:style>
-          <a:lnRef idx="1">
-            <a:schemeClr val="dk1"/>
-          </a:lnRef>
-          <a:fillRef idx="0">
-            <a:schemeClr val="dk1"/>
-          </a:fillRef>
-          <a:effectRef idx="0">
-            <a:schemeClr val="dk1"/>
-          </a:effectRef>
-          <a:fontRef idx="minor">
-            <a:schemeClr val="tx1"/>
-          </a:fontRef>
-        </p:style>
-      </p:cxnSp>
-      <p:sp>
-        <p:nvSpPr>
-          <p:cNvPr id="16" name="TextBox 15"/>
-          <p:cNvSpPr txBox="1"/>
-          <p:nvPr/>
-        </p:nvSpPr>
-        <p:spPr>
-          <a:xfrm>
-            <a:off x="6565557" y="3012128"/>
-            <a:ext cx="576652" cy="369332"/>
-          </a:xfrm>
-          <a:prstGeom prst="rect">
-            <a:avLst/>
-          </a:prstGeom>
-          <a:noFill/>
-        </p:spPr>
-        <p:txBody>
-          <a:bodyPr wrap="square" rtlCol="0">
-            <a:spAutoFit/>
-          </a:bodyPr>
-          <a:lstStyle/>
-          <a:p>
-            <a:r>
-              <a:rPr lang="en-US" dirty="0" smtClean="0">
-                <a:latin typeface="Consolas" panose="020B0609020204030204" pitchFamily="49" charset="0"/>
-                <a:cs typeface="Consolas" panose="020B0609020204030204" pitchFamily="49" charset="0"/>
-              </a:rPr>
-              <a:t>...</a:t>
-            </a:r>
-            <a:endParaRPr lang="en-US" dirty="0">
-              <a:latin typeface="Consolas" panose="020B0609020204030204" pitchFamily="49" charset="0"/>
-              <a:cs typeface="Consolas" panose="020B0609020204030204" pitchFamily="49" charset="0"/>
-            </a:endParaRPr>
-          </a:p>
-        </p:txBody>
-      </p:sp>
-      <p:cxnSp>
-        <p:nvCxnSpPr>
-          <p:cNvPr id="21" name="Straight Connector 20"/>
-          <p:cNvCxnSpPr/>
-          <p:nvPr/>
-        </p:nvCxnSpPr>
-        <p:spPr>
-          <a:xfrm>
-            <a:off x="7043354" y="2983124"/>
-            <a:ext cx="0" cy="427340"/>
-          </a:xfrm>
-          <a:prstGeom prst="line">
-            <a:avLst/>
-          </a:prstGeom>
-          <a:ln w="12700"/>
-        </p:spPr>
-        <p:style>
-          <a:lnRef idx="1">
-            <a:schemeClr val="dk1"/>
-          </a:lnRef>
-          <a:fillRef idx="0">
-            <a:schemeClr val="dk1"/>
-          </a:fillRef>
-          <a:effectRef idx="0">
-            <a:schemeClr val="dk1"/>
-          </a:effectRef>
-          <a:fontRef idx="minor">
-            <a:schemeClr val="tx1"/>
-          </a:fontRef>
-        </p:style>
-      </p:cxnSp>
-      <p:sp>
-        <p:nvSpPr>
-          <p:cNvPr id="22" name="TextBox 21"/>
-          <p:cNvSpPr txBox="1"/>
-          <p:nvPr/>
-        </p:nvSpPr>
-        <p:spPr>
-          <a:xfrm>
-            <a:off x="6985689" y="3012128"/>
-            <a:ext cx="1458096" cy="369332"/>
-          </a:xfrm>
-          <a:prstGeom prst="rect">
-            <a:avLst/>
-          </a:prstGeom>
-          <a:noFill/>
-        </p:spPr>
-        <p:txBody>
-          <a:bodyPr wrap="square" rtlCol="0">
-            <a:spAutoFit/>
-          </a:bodyPr>
-          <a:lstStyle/>
-          <a:p>
-            <a:r>
-              <a:rPr lang="en-US" dirty="0" smtClean="0">
-                <a:latin typeface="Consolas" panose="020B0609020204030204" pitchFamily="49" charset="0"/>
-                <a:cs typeface="Consolas" panose="020B0609020204030204" pitchFamily="49" charset="0"/>
-              </a:rPr>
-              <a:t>Prefix L-1</a:t>
-            </a:r>
-            <a:endParaRPr lang="en-US" dirty="0">
-              <a:latin typeface="Consolas" panose="020B0609020204030204" pitchFamily="49" charset="0"/>
-              <a:cs typeface="Consolas" panose="020B0609020204030204" pitchFamily="49" charset="0"/>
-            </a:endParaRPr>
-          </a:p>
-        </p:txBody>
-      </p:sp>
-      <p:cxnSp>
-        <p:nvCxnSpPr>
-          <p:cNvPr id="23" name="Straight Connector 22"/>
-          <p:cNvCxnSpPr/>
-          <p:nvPr/>
-        </p:nvCxnSpPr>
-        <p:spPr>
-          <a:xfrm>
-            <a:off x="8369645" y="2983124"/>
-            <a:ext cx="0" cy="427340"/>
-          </a:xfrm>
-          <a:prstGeom prst="line">
-            <a:avLst/>
-          </a:prstGeom>
-          <a:ln w="12700"/>
-        </p:spPr>
-        <p:style>
-          <a:lnRef idx="1">
-            <a:schemeClr val="dk1"/>
-          </a:lnRef>
-          <a:fillRef idx="0">
-            <a:schemeClr val="dk1"/>
-          </a:fillRef>
-          <a:effectRef idx="0">
-            <a:schemeClr val="dk1"/>
-          </a:effectRef>
-          <a:fontRef idx="minor">
-            <a:schemeClr val="tx1"/>
-          </a:fontRef>
-        </p:style>
-      </p:cxnSp>
-      <p:sp>
-        <p:nvSpPr>
-          <p:cNvPr id="25" name="TextBox 24"/>
-          <p:cNvSpPr txBox="1"/>
-          <p:nvPr/>
-        </p:nvSpPr>
-        <p:spPr>
-          <a:xfrm>
-            <a:off x="8402598" y="3004917"/>
-            <a:ext cx="1482810" cy="369332"/>
-          </a:xfrm>
-          <a:prstGeom prst="rect">
-            <a:avLst/>
-          </a:prstGeom>
-          <a:noFill/>
-        </p:spPr>
-        <p:txBody>
-          <a:bodyPr wrap="square" rtlCol="0">
-            <a:spAutoFit/>
-          </a:bodyPr>
-          <a:lstStyle/>
-          <a:p>
-            <a:r>
-              <a:rPr lang="en-US" dirty="0" smtClean="0">
-                <a:latin typeface="Consolas" panose="020B0609020204030204" pitchFamily="49" charset="0"/>
-                <a:cs typeface="Consolas" panose="020B0609020204030204" pitchFamily="49" charset="0"/>
-              </a:rPr>
-              <a:t>Contain 1</a:t>
-            </a:r>
-            <a:endParaRPr lang="en-US" dirty="0">
-              <a:latin typeface="Consolas" panose="020B0609020204030204" pitchFamily="49" charset="0"/>
-              <a:cs typeface="Consolas" panose="020B0609020204030204" pitchFamily="49" charset="0"/>
-            </a:endParaRPr>
-          </a:p>
-        </p:txBody>
-      </p:sp>
-      <p:cxnSp>
-        <p:nvCxnSpPr>
-          <p:cNvPr id="26" name="Straight Connector 25"/>
-          <p:cNvCxnSpPr/>
-          <p:nvPr/>
-        </p:nvCxnSpPr>
-        <p:spPr>
-          <a:xfrm>
-            <a:off x="9679461" y="2975913"/>
-            <a:ext cx="0" cy="427340"/>
-          </a:xfrm>
-          <a:prstGeom prst="line">
-            <a:avLst/>
-          </a:prstGeom>
-          <a:ln w="12700"/>
-        </p:spPr>
-        <p:style>
-          <a:lnRef idx="1">
-            <a:schemeClr val="dk1"/>
-          </a:lnRef>
-          <a:fillRef idx="0">
-            <a:schemeClr val="dk1"/>
-          </a:fillRef>
-          <a:effectRef idx="0">
-            <a:schemeClr val="dk1"/>
-          </a:effectRef>
-          <a:fontRef idx="minor">
-            <a:schemeClr val="tx1"/>
-          </a:fontRef>
-        </p:style>
-      </p:cxnSp>
-      <p:sp>
-        <p:nvSpPr>
-          <p:cNvPr id="29" name="TextBox 28"/>
-          <p:cNvSpPr txBox="1"/>
-          <p:nvPr/>
-        </p:nvSpPr>
-        <p:spPr>
-          <a:xfrm>
-            <a:off x="9634150" y="2990495"/>
-            <a:ext cx="576652" cy="369332"/>
-          </a:xfrm>
-          <a:prstGeom prst="rect">
-            <a:avLst/>
-          </a:prstGeom>
-          <a:noFill/>
-        </p:spPr>
-        <p:txBody>
-          <a:bodyPr wrap="square" rtlCol="0">
-            <a:spAutoFit/>
-          </a:bodyPr>
-          <a:lstStyle/>
-          <a:p>
-            <a:r>
-              <a:rPr lang="en-US" dirty="0" smtClean="0">
-                <a:latin typeface="Consolas" panose="020B0609020204030204" pitchFamily="49" charset="0"/>
-                <a:cs typeface="Consolas" panose="020B0609020204030204" pitchFamily="49" charset="0"/>
-              </a:rPr>
-              <a:t>...</a:t>
-            </a:r>
-            <a:endParaRPr lang="en-US" dirty="0">
-              <a:latin typeface="Consolas" panose="020B0609020204030204" pitchFamily="49" charset="0"/>
-              <a:cs typeface="Consolas" panose="020B0609020204030204" pitchFamily="49" charset="0"/>
-            </a:endParaRPr>
-          </a:p>
-        </p:txBody>
-      </p:sp>
-      <p:cxnSp>
-        <p:nvCxnSpPr>
-          <p:cNvPr id="30" name="Straight Connector 29"/>
-          <p:cNvCxnSpPr/>
-          <p:nvPr/>
-        </p:nvCxnSpPr>
-        <p:spPr>
-          <a:xfrm>
-            <a:off x="10149017" y="2975913"/>
-            <a:ext cx="0" cy="427340"/>
-          </a:xfrm>
-          <a:prstGeom prst="line">
-            <a:avLst/>
-          </a:prstGeom>
-          <a:ln w="12700"/>
-        </p:spPr>
-        <p:style>
-          <a:lnRef idx="1">
-            <a:schemeClr val="dk1"/>
-          </a:lnRef>
-          <a:fillRef idx="0">
-            <a:schemeClr val="dk1"/>
-          </a:fillRef>
-          <a:effectRef idx="0">
-            <a:schemeClr val="dk1"/>
-          </a:effectRef>
-          <a:fontRef idx="minor">
-            <a:schemeClr val="tx1"/>
-          </a:fontRef>
-        </p:style>
-      </p:cxnSp>
-      <p:sp>
-        <p:nvSpPr>
-          <p:cNvPr id="31" name="TextBox 30"/>
-          <p:cNvSpPr txBox="1"/>
-          <p:nvPr/>
-        </p:nvSpPr>
-        <p:spPr>
-          <a:xfrm>
-            <a:off x="10140779" y="3012128"/>
-            <a:ext cx="1614615" cy="369332"/>
-          </a:xfrm>
-          <a:prstGeom prst="rect">
-            <a:avLst/>
-          </a:prstGeom>
-          <a:noFill/>
-        </p:spPr>
-        <p:txBody>
-          <a:bodyPr wrap="square" rtlCol="0">
-            <a:spAutoFit/>
-          </a:bodyPr>
-          <a:lstStyle/>
-          <a:p>
-            <a:r>
-              <a:rPr lang="en-US" dirty="0">
-                <a:latin typeface="Consolas" panose="020B0609020204030204" pitchFamily="49" charset="0"/>
-                <a:cs typeface="Consolas" panose="020B0609020204030204" pitchFamily="49" charset="0"/>
-              </a:rPr>
-              <a:t>C</a:t>
-            </a:r>
-            <a:r>
-              <a:rPr lang="en-US" dirty="0" smtClean="0">
-                <a:latin typeface="Consolas" panose="020B0609020204030204" pitchFamily="49" charset="0"/>
-                <a:cs typeface="Consolas" panose="020B0609020204030204" pitchFamily="49" charset="0"/>
-              </a:rPr>
-              <a:t>ontain L-1</a:t>
-            </a:r>
-            <a:endParaRPr lang="en-US" dirty="0">
-              <a:latin typeface="Consolas" panose="020B0609020204030204" pitchFamily="49" charset="0"/>
-              <a:cs typeface="Consolas" panose="020B0609020204030204" pitchFamily="49" charset="0"/>
-            </a:endParaRPr>
-          </a:p>
-        </p:txBody>
-      </p:sp>
+      </p:pic>
     </p:spTree>
     <p:extLst>
       <p:ext uri="{BB962C8B-B14F-4D97-AF65-F5344CB8AC3E}">
-        <p14:creationId xmlns:p14="http://schemas.microsoft.com/office/powerpoint/2010/main" val="3145709934"/>
+        <p14:creationId xmlns:p14="http://schemas.microsoft.com/office/powerpoint/2010/main" val="1140815350"/>
+      </p:ext>
+    </p:extLst>
+  </p:cSld>
+  <p:clrMapOvr>
+    <a:masterClrMapping/>
+  </p:clrMapOvr>
+</p:sld>
+</file>
+
+<file path=ppt/slides/slide9.xml><?xml version="1.0" encoding="utf-8"?>
+<p:sld xmlns:a="http://schemas.openxmlformats.org/drawingml/2006/main" xmlns:r="http://schemas.openxmlformats.org/officeDocument/2006/relationships" xmlns:p="http://schemas.openxmlformats.org/presentationml/2006/main">
+  <p:cSld>
+    <p:spTree>
+      <p:nvGrpSpPr>
+        <p:cNvPr id="1" name=""/>
+        <p:cNvGrpSpPr/>
+        <p:nvPr/>
+      </p:nvGrpSpPr>
+      <p:grpSpPr>
+        <a:xfrm>
+          <a:off x="0" y="0"/>
+          <a:ext cx="0" cy="0"/>
+          <a:chOff x="0" y="0"/>
+          <a:chExt cx="0" cy="0"/>
+        </a:xfrm>
+      </p:grpSpPr>
+      <p:sp>
+        <p:nvSpPr>
+          <p:cNvPr id="4" name="Rectangle 3"/>
+          <p:cNvSpPr/>
+          <p:nvPr/>
+        </p:nvSpPr>
+        <p:spPr>
+          <a:xfrm>
+            <a:off x="3229108" y="2830211"/>
+            <a:ext cx="1328762" cy="782595"/>
+          </a:xfrm>
+          <a:prstGeom prst="rect">
+            <a:avLst/>
+          </a:prstGeom>
+        </p:spPr>
+        <p:style>
+          <a:lnRef idx="2">
+            <a:schemeClr val="dk1"/>
+          </a:lnRef>
+          <a:fillRef idx="1">
+            <a:schemeClr val="lt1"/>
+          </a:fillRef>
+          <a:effectRef idx="0">
+            <a:schemeClr val="dk1"/>
+          </a:effectRef>
+          <a:fontRef idx="minor">
+            <a:schemeClr val="dk1"/>
+          </a:fontRef>
+        </p:style>
+        <p:txBody>
+          <a:bodyPr rtlCol="0" anchor="ctr"/>
+          <a:lstStyle/>
+          <a:p>
+            <a:pPr algn="ctr"/>
+            <a:r>
+              <a:rPr lang="en-US" sz="1600" dirty="0" smtClean="0"/>
+              <a:t>Find program points for patching</a:t>
+            </a:r>
+            <a:endParaRPr lang="en-US" sz="1600" dirty="0"/>
+          </a:p>
+        </p:txBody>
+      </p:sp>
+      <p:sp>
+        <p:nvSpPr>
+          <p:cNvPr id="5" name="Rectangle 4"/>
+          <p:cNvSpPr/>
+          <p:nvPr/>
+        </p:nvSpPr>
+        <p:spPr>
+          <a:xfrm>
+            <a:off x="4839758" y="2830211"/>
+            <a:ext cx="1288759" cy="782595"/>
+          </a:xfrm>
+          <a:prstGeom prst="rect">
+            <a:avLst/>
+          </a:prstGeom>
+        </p:spPr>
+        <p:style>
+          <a:lnRef idx="2">
+            <a:schemeClr val="dk1"/>
+          </a:lnRef>
+          <a:fillRef idx="1">
+            <a:schemeClr val="lt1"/>
+          </a:fillRef>
+          <a:effectRef idx="0">
+            <a:schemeClr val="dk1"/>
+          </a:effectRef>
+          <a:fontRef idx="minor">
+            <a:schemeClr val="dk1"/>
+          </a:fontRef>
+        </p:style>
+        <p:txBody>
+          <a:bodyPr rtlCol="0" anchor="ctr"/>
+          <a:lstStyle/>
+          <a:p>
+            <a:pPr algn="ctr"/>
+            <a:r>
+              <a:rPr lang="en-US" sz="1600" dirty="0" smtClean="0"/>
+              <a:t>Static </a:t>
+            </a:r>
+            <a:r>
+              <a:rPr lang="en-US" sz="1600" dirty="0"/>
+              <a:t>c</a:t>
+            </a:r>
+            <a:r>
+              <a:rPr lang="en-US" sz="1600" dirty="0" smtClean="0"/>
+              <a:t>onstraint </a:t>
+            </a:r>
+            <a:r>
+              <a:rPr lang="en-US" sz="1600" dirty="0"/>
+              <a:t>a</a:t>
+            </a:r>
+            <a:r>
+              <a:rPr lang="en-US" sz="1600" dirty="0" smtClean="0"/>
+              <a:t>nalysis</a:t>
+            </a:r>
+            <a:endParaRPr lang="en-US" sz="1600" dirty="0"/>
+          </a:p>
+        </p:txBody>
+      </p:sp>
+      <p:sp>
+        <p:nvSpPr>
+          <p:cNvPr id="6" name="Rounded Rectangle 5"/>
+          <p:cNvSpPr/>
+          <p:nvPr/>
+        </p:nvSpPr>
+        <p:spPr>
+          <a:xfrm>
+            <a:off x="2031736" y="2927006"/>
+            <a:ext cx="915484" cy="589006"/>
+          </a:xfrm>
+          <a:prstGeom prst="roundRect">
+            <a:avLst/>
+          </a:prstGeom>
+          <a:ln w="19050"/>
+        </p:spPr>
+        <p:style>
+          <a:lnRef idx="2">
+            <a:schemeClr val="dk1"/>
+          </a:lnRef>
+          <a:fillRef idx="1">
+            <a:schemeClr val="lt1"/>
+          </a:fillRef>
+          <a:effectRef idx="0">
+            <a:schemeClr val="dk1"/>
+          </a:effectRef>
+          <a:fontRef idx="minor">
+            <a:schemeClr val="dk1"/>
+          </a:fontRef>
+        </p:style>
+        <p:txBody>
+          <a:bodyPr rtlCol="0" anchor="ctr"/>
+          <a:lstStyle/>
+          <a:p>
+            <a:pPr algn="ctr"/>
+            <a:r>
+              <a:rPr lang="en-US" sz="1400" dirty="0" smtClean="0"/>
+              <a:t>Input program</a:t>
+            </a:r>
+            <a:endParaRPr lang="en-US" sz="1400" dirty="0"/>
+          </a:p>
+        </p:txBody>
+      </p:sp>
+      <p:sp>
+        <p:nvSpPr>
+          <p:cNvPr id="38" name="Rectangle 37"/>
+          <p:cNvSpPr/>
+          <p:nvPr/>
+        </p:nvSpPr>
+        <p:spPr>
+          <a:xfrm>
+            <a:off x="6450408" y="2830211"/>
+            <a:ext cx="1035161" cy="782595"/>
+          </a:xfrm>
+          <a:prstGeom prst="rect">
+            <a:avLst/>
+          </a:prstGeom>
+        </p:spPr>
+        <p:style>
+          <a:lnRef idx="2">
+            <a:schemeClr val="dk1"/>
+          </a:lnRef>
+          <a:fillRef idx="1">
+            <a:schemeClr val="lt1"/>
+          </a:fillRef>
+          <a:effectRef idx="0">
+            <a:schemeClr val="dk1"/>
+          </a:effectRef>
+          <a:fontRef idx="minor">
+            <a:schemeClr val="dk1"/>
+          </a:fontRef>
+        </p:style>
+        <p:txBody>
+          <a:bodyPr rtlCol="0" anchor="ctr"/>
+          <a:lstStyle/>
+          <a:p>
+            <a:pPr algn="ctr"/>
+            <a:r>
+              <a:rPr lang="en-US" sz="1600" dirty="0" smtClean="0"/>
+              <a:t>Patching</a:t>
+            </a:r>
+            <a:endParaRPr lang="en-US" sz="1600" dirty="0"/>
+          </a:p>
+        </p:txBody>
+      </p:sp>
+      <p:sp>
+        <p:nvSpPr>
+          <p:cNvPr id="61" name="Rectangle 60"/>
+          <p:cNvSpPr/>
+          <p:nvPr/>
+        </p:nvSpPr>
+        <p:spPr>
+          <a:xfrm>
+            <a:off x="7186005" y="3783532"/>
+            <a:ext cx="1955745" cy="716692"/>
+          </a:xfrm>
+          <a:prstGeom prst="rect">
+            <a:avLst/>
+          </a:prstGeom>
+        </p:spPr>
+        <p:style>
+          <a:lnRef idx="2">
+            <a:schemeClr val="dk1"/>
+          </a:lnRef>
+          <a:fillRef idx="1">
+            <a:schemeClr val="lt1"/>
+          </a:fillRef>
+          <a:effectRef idx="0">
+            <a:schemeClr val="dk1"/>
+          </a:effectRef>
+          <a:fontRef idx="minor">
+            <a:schemeClr val="dk1"/>
+          </a:fontRef>
+        </p:style>
+        <p:txBody>
+          <a:bodyPr rtlCol="0" anchor="ctr"/>
+          <a:lstStyle/>
+          <a:p>
+            <a:pPr algn="ctr"/>
+            <a:r>
+              <a:rPr lang="en-US" sz="1600" dirty="0" smtClean="0"/>
+              <a:t>Dynamic constraint analysis </a:t>
+            </a:r>
+            <a:endParaRPr lang="en-US" sz="1600" dirty="0"/>
+          </a:p>
+        </p:txBody>
+      </p:sp>
+      <p:cxnSp>
+        <p:nvCxnSpPr>
+          <p:cNvPr id="89" name="Straight Arrow Connector 88"/>
+          <p:cNvCxnSpPr>
+            <a:stCxn id="6" idx="3"/>
+            <a:endCxn id="4" idx="1"/>
+          </p:cNvCxnSpPr>
+          <p:nvPr/>
+        </p:nvCxnSpPr>
+        <p:spPr>
+          <a:xfrm>
+            <a:off x="2947220" y="3221509"/>
+            <a:ext cx="281888" cy="0"/>
+          </a:xfrm>
+          <a:prstGeom prst="straightConnector1">
+            <a:avLst/>
+          </a:prstGeom>
+          <a:ln w="12700">
+            <a:tailEnd type="triangle"/>
+          </a:ln>
+        </p:spPr>
+        <p:style>
+          <a:lnRef idx="1">
+            <a:schemeClr val="dk1"/>
+          </a:lnRef>
+          <a:fillRef idx="0">
+            <a:schemeClr val="dk1"/>
+          </a:fillRef>
+          <a:effectRef idx="0">
+            <a:schemeClr val="dk1"/>
+          </a:effectRef>
+          <a:fontRef idx="minor">
+            <a:schemeClr val="tx1"/>
+          </a:fontRef>
+        </p:style>
+      </p:cxnSp>
+      <p:cxnSp>
+        <p:nvCxnSpPr>
+          <p:cNvPr id="27" name="Straight Arrow Connector 26"/>
+          <p:cNvCxnSpPr>
+            <a:stCxn id="4" idx="3"/>
+            <a:endCxn id="5" idx="1"/>
+          </p:cNvCxnSpPr>
+          <p:nvPr/>
+        </p:nvCxnSpPr>
+        <p:spPr>
+          <a:xfrm>
+            <a:off x="4557870" y="3221509"/>
+            <a:ext cx="281888" cy="0"/>
+          </a:xfrm>
+          <a:prstGeom prst="straightConnector1">
+            <a:avLst/>
+          </a:prstGeom>
+          <a:ln w="12700">
+            <a:tailEnd type="triangle"/>
+          </a:ln>
+        </p:spPr>
+        <p:style>
+          <a:lnRef idx="1">
+            <a:schemeClr val="dk1"/>
+          </a:lnRef>
+          <a:fillRef idx="0">
+            <a:schemeClr val="dk1"/>
+          </a:fillRef>
+          <a:effectRef idx="0">
+            <a:schemeClr val="dk1"/>
+          </a:effectRef>
+          <a:fontRef idx="minor">
+            <a:schemeClr val="tx1"/>
+          </a:fontRef>
+        </p:style>
+      </p:cxnSp>
+      <p:cxnSp>
+        <p:nvCxnSpPr>
+          <p:cNvPr id="30" name="Straight Arrow Connector 29"/>
+          <p:cNvCxnSpPr>
+            <a:stCxn id="5" idx="3"/>
+            <a:endCxn id="38" idx="1"/>
+          </p:cNvCxnSpPr>
+          <p:nvPr/>
+        </p:nvCxnSpPr>
+        <p:spPr>
+          <a:xfrm>
+            <a:off x="6128517" y="3221509"/>
+            <a:ext cx="321891" cy="0"/>
+          </a:xfrm>
+          <a:prstGeom prst="straightConnector1">
+            <a:avLst/>
+          </a:prstGeom>
+          <a:ln w="12700">
+            <a:tailEnd type="triangle"/>
+          </a:ln>
+        </p:spPr>
+        <p:style>
+          <a:lnRef idx="1">
+            <a:schemeClr val="dk1"/>
+          </a:lnRef>
+          <a:fillRef idx="0">
+            <a:schemeClr val="dk1"/>
+          </a:fillRef>
+          <a:effectRef idx="0">
+            <a:schemeClr val="dk1"/>
+          </a:effectRef>
+          <a:fontRef idx="minor">
+            <a:schemeClr val="tx1"/>
+          </a:fontRef>
+        </p:style>
+      </p:cxnSp>
+      <p:sp>
+        <p:nvSpPr>
+          <p:cNvPr id="33" name="Rounded Rectangle 32"/>
+          <p:cNvSpPr/>
+          <p:nvPr/>
+        </p:nvSpPr>
+        <p:spPr>
+          <a:xfrm>
+            <a:off x="7733666" y="2927006"/>
+            <a:ext cx="1159987" cy="589006"/>
+          </a:xfrm>
+          <a:prstGeom prst="roundRect">
+            <a:avLst/>
+          </a:prstGeom>
+          <a:ln w="19050"/>
+        </p:spPr>
+        <p:style>
+          <a:lnRef idx="2">
+            <a:schemeClr val="dk1"/>
+          </a:lnRef>
+          <a:fillRef idx="1">
+            <a:schemeClr val="lt1"/>
+          </a:fillRef>
+          <a:effectRef idx="0">
+            <a:schemeClr val="dk1"/>
+          </a:effectRef>
+          <a:fontRef idx="minor">
+            <a:schemeClr val="dk1"/>
+          </a:fontRef>
+        </p:style>
+        <p:txBody>
+          <a:bodyPr rtlCol="0" anchor="ctr"/>
+          <a:lstStyle/>
+          <a:p>
+            <a:pPr algn="ctr"/>
+            <a:r>
+              <a:rPr lang="en-US" sz="1400" dirty="0" smtClean="0"/>
+              <a:t>Repaired program</a:t>
+            </a:r>
+            <a:endParaRPr lang="en-US" sz="1400" dirty="0"/>
+          </a:p>
+        </p:txBody>
+      </p:sp>
+      <p:sp>
+        <p:nvSpPr>
+          <p:cNvPr id="19" name="Oval 18"/>
+          <p:cNvSpPr/>
+          <p:nvPr/>
+        </p:nvSpPr>
+        <p:spPr>
+          <a:xfrm>
+            <a:off x="9141750" y="2861182"/>
+            <a:ext cx="708338" cy="708338"/>
+          </a:xfrm>
+          <a:prstGeom prst="ellipse">
+            <a:avLst/>
+          </a:prstGeom>
+        </p:spPr>
+        <p:style>
+          <a:lnRef idx="2">
+            <a:schemeClr val="dk1"/>
+          </a:lnRef>
+          <a:fillRef idx="1">
+            <a:schemeClr val="lt1"/>
+          </a:fillRef>
+          <a:effectRef idx="0">
+            <a:schemeClr val="dk1"/>
+          </a:effectRef>
+          <a:fontRef idx="minor">
+            <a:schemeClr val="dk1"/>
+          </a:fontRef>
+        </p:style>
+        <p:txBody>
+          <a:bodyPr rtlCol="0" anchor="ctr"/>
+          <a:lstStyle/>
+          <a:p>
+            <a:pPr algn="ctr"/>
+            <a:r>
+              <a:rPr lang="en-US" sz="1400" dirty="0" smtClean="0"/>
+              <a:t>Run</a:t>
+            </a:r>
+            <a:endParaRPr lang="en-US" sz="1400" dirty="0"/>
+          </a:p>
+        </p:txBody>
+      </p:sp>
+      <p:cxnSp>
+        <p:nvCxnSpPr>
+          <p:cNvPr id="35" name="Straight Arrow Connector 34"/>
+          <p:cNvCxnSpPr>
+            <a:stCxn id="38" idx="3"/>
+            <a:endCxn id="33" idx="1"/>
+          </p:cNvCxnSpPr>
+          <p:nvPr/>
+        </p:nvCxnSpPr>
+        <p:spPr>
+          <a:xfrm>
+            <a:off x="7485569" y="3221509"/>
+            <a:ext cx="248097" cy="0"/>
+          </a:xfrm>
+          <a:prstGeom prst="straightConnector1">
+            <a:avLst/>
+          </a:prstGeom>
+          <a:ln w="12700">
+            <a:tailEnd type="triangle"/>
+          </a:ln>
+        </p:spPr>
+        <p:style>
+          <a:lnRef idx="1">
+            <a:schemeClr val="dk1"/>
+          </a:lnRef>
+          <a:fillRef idx="0">
+            <a:schemeClr val="dk1"/>
+          </a:fillRef>
+          <a:effectRef idx="0">
+            <a:schemeClr val="dk1"/>
+          </a:effectRef>
+          <a:fontRef idx="minor">
+            <a:schemeClr val="tx1"/>
+          </a:fontRef>
+        </p:style>
+      </p:cxnSp>
+      <p:cxnSp>
+        <p:nvCxnSpPr>
+          <p:cNvPr id="41" name="Straight Arrow Connector 40"/>
+          <p:cNvCxnSpPr>
+            <a:stCxn id="33" idx="3"/>
+            <a:endCxn id="19" idx="2"/>
+          </p:cNvCxnSpPr>
+          <p:nvPr/>
+        </p:nvCxnSpPr>
+        <p:spPr>
+          <a:xfrm flipV="1">
+            <a:off x="8893653" y="3215351"/>
+            <a:ext cx="248097" cy="6158"/>
+          </a:xfrm>
+          <a:prstGeom prst="straightConnector1">
+            <a:avLst/>
+          </a:prstGeom>
+          <a:ln w="12700">
+            <a:tailEnd type="triangle"/>
+          </a:ln>
+        </p:spPr>
+        <p:style>
+          <a:lnRef idx="1">
+            <a:schemeClr val="dk1"/>
+          </a:lnRef>
+          <a:fillRef idx="0">
+            <a:schemeClr val="dk1"/>
+          </a:fillRef>
+          <a:effectRef idx="0">
+            <a:schemeClr val="dk1"/>
+          </a:effectRef>
+          <a:fontRef idx="minor">
+            <a:schemeClr val="tx1"/>
+          </a:fontRef>
+        </p:style>
+      </p:cxnSp>
+      <p:cxnSp>
+        <p:nvCxnSpPr>
+          <p:cNvPr id="31" name="Elbow Connector 30"/>
+          <p:cNvCxnSpPr>
+            <a:stCxn id="19" idx="4"/>
+            <a:endCxn id="61" idx="3"/>
+          </p:cNvCxnSpPr>
+          <p:nvPr/>
+        </p:nvCxnSpPr>
+        <p:spPr>
+          <a:xfrm rot="5400000">
+            <a:off x="9032656" y="3678615"/>
+            <a:ext cx="572358" cy="354169"/>
+          </a:xfrm>
+          <a:prstGeom prst="bentConnector2">
+            <a:avLst/>
+          </a:prstGeom>
+          <a:ln>
+            <a:tailEnd type="triangle"/>
+          </a:ln>
+        </p:spPr>
+        <p:style>
+          <a:lnRef idx="1">
+            <a:schemeClr val="dk1"/>
+          </a:lnRef>
+          <a:fillRef idx="0">
+            <a:schemeClr val="dk1"/>
+          </a:fillRef>
+          <a:effectRef idx="0">
+            <a:schemeClr val="dk1"/>
+          </a:effectRef>
+          <a:fontRef idx="minor">
+            <a:schemeClr val="tx1"/>
+          </a:fontRef>
+        </p:style>
+      </p:cxnSp>
+      <p:cxnSp>
+        <p:nvCxnSpPr>
+          <p:cNvPr id="43" name="Straight Connector 42"/>
+          <p:cNvCxnSpPr>
+            <a:endCxn id="61" idx="1"/>
+          </p:cNvCxnSpPr>
+          <p:nvPr/>
+        </p:nvCxnSpPr>
+        <p:spPr>
+          <a:xfrm>
+            <a:off x="6269583" y="4141878"/>
+            <a:ext cx="916422" cy="0"/>
+          </a:xfrm>
+          <a:prstGeom prst="line">
+            <a:avLst/>
+          </a:prstGeom>
+        </p:spPr>
+        <p:style>
+          <a:lnRef idx="1">
+            <a:schemeClr val="dk1"/>
+          </a:lnRef>
+          <a:fillRef idx="0">
+            <a:schemeClr val="dk1"/>
+          </a:fillRef>
+          <a:effectRef idx="0">
+            <a:schemeClr val="dk1"/>
+          </a:effectRef>
+          <a:fontRef idx="minor">
+            <a:schemeClr val="tx1"/>
+          </a:fontRef>
+        </p:style>
+      </p:cxnSp>
+      <p:cxnSp>
+        <p:nvCxnSpPr>
+          <p:cNvPr id="56" name="Elbow Connector 55"/>
+          <p:cNvCxnSpPr>
+            <a:endCxn id="38" idx="1"/>
+          </p:cNvCxnSpPr>
+          <p:nvPr/>
+        </p:nvCxnSpPr>
+        <p:spPr>
+          <a:xfrm rot="5400000" flipH="1" flipV="1">
+            <a:off x="5899806" y="3591287"/>
+            <a:ext cx="920379" cy="180825"/>
+          </a:xfrm>
+          <a:prstGeom prst="bentConnector2">
+            <a:avLst/>
+          </a:prstGeom>
+          <a:ln w="9525">
+            <a:tailEnd type="triangle"/>
+          </a:ln>
+        </p:spPr>
+        <p:style>
+          <a:lnRef idx="1">
+            <a:schemeClr val="dk1"/>
+          </a:lnRef>
+          <a:fillRef idx="0">
+            <a:schemeClr val="dk1"/>
+          </a:fillRef>
+          <a:effectRef idx="0">
+            <a:schemeClr val="dk1"/>
+          </a:effectRef>
+          <a:fontRef idx="minor">
+            <a:schemeClr val="tx1"/>
+          </a:fontRef>
+        </p:style>
+      </p:cxnSp>
+    </p:spTree>
+    <p:extLst>
+      <p:ext uri="{BB962C8B-B14F-4D97-AF65-F5344CB8AC3E}">
+        <p14:creationId xmlns:p14="http://schemas.microsoft.com/office/powerpoint/2010/main" val="201351828"/>
       </p:ext>
     </p:extLst>
   </p:cSld>

</xml_diff>